<commit_message>
Updated design diagram and made it so that threads close on window exit.
</commit_message>
<xml_diff>
--- a/UNM/CS351/SmartRailLab/doc/SmartRail Design Diagram.pptx
+++ b/UNM/CS351/SmartRailLab/doc/SmartRail Design Diagram.pptx
@@ -289,7 +289,7 @@
           <a:p>
             <a:fld id="{95BA4CF9-B78C-45B4-9A3B-73F055770954}" type="datetimeFigureOut">
               <a:rPr lang="en-US" smtClean="0"/>
-              <a:t>11/13/2017</a:t>
+              <a:t>11/14/2017</a:t>
             </a:fld>
             <a:endParaRPr lang="en-US"/>
           </a:p>
@@ -459,7 +459,7 @@
           <a:p>
             <a:fld id="{95BA4CF9-B78C-45B4-9A3B-73F055770954}" type="datetimeFigureOut">
               <a:rPr lang="en-US" smtClean="0"/>
-              <a:t>11/13/2017</a:t>
+              <a:t>11/14/2017</a:t>
             </a:fld>
             <a:endParaRPr lang="en-US"/>
           </a:p>
@@ -639,7 +639,7 @@
           <a:p>
             <a:fld id="{95BA4CF9-B78C-45B4-9A3B-73F055770954}" type="datetimeFigureOut">
               <a:rPr lang="en-US" smtClean="0"/>
-              <a:t>11/13/2017</a:t>
+              <a:t>11/14/2017</a:t>
             </a:fld>
             <a:endParaRPr lang="en-US"/>
           </a:p>
@@ -809,7 +809,7 @@
           <a:p>
             <a:fld id="{95BA4CF9-B78C-45B4-9A3B-73F055770954}" type="datetimeFigureOut">
               <a:rPr lang="en-US" smtClean="0"/>
-              <a:t>11/13/2017</a:t>
+              <a:t>11/14/2017</a:t>
             </a:fld>
             <a:endParaRPr lang="en-US"/>
           </a:p>
@@ -1055,7 +1055,7 @@
           <a:p>
             <a:fld id="{95BA4CF9-B78C-45B4-9A3B-73F055770954}" type="datetimeFigureOut">
               <a:rPr lang="en-US" smtClean="0"/>
-              <a:t>11/13/2017</a:t>
+              <a:t>11/14/2017</a:t>
             </a:fld>
             <a:endParaRPr lang="en-US"/>
           </a:p>
@@ -1343,7 +1343,7 @@
           <a:p>
             <a:fld id="{95BA4CF9-B78C-45B4-9A3B-73F055770954}" type="datetimeFigureOut">
               <a:rPr lang="en-US" smtClean="0"/>
-              <a:t>11/13/2017</a:t>
+              <a:t>11/14/2017</a:t>
             </a:fld>
             <a:endParaRPr lang="en-US"/>
           </a:p>
@@ -1765,7 +1765,7 @@
           <a:p>
             <a:fld id="{95BA4CF9-B78C-45B4-9A3B-73F055770954}" type="datetimeFigureOut">
               <a:rPr lang="en-US" smtClean="0"/>
-              <a:t>11/13/2017</a:t>
+              <a:t>11/14/2017</a:t>
             </a:fld>
             <a:endParaRPr lang="en-US"/>
           </a:p>
@@ -1883,7 +1883,7 @@
           <a:p>
             <a:fld id="{95BA4CF9-B78C-45B4-9A3B-73F055770954}" type="datetimeFigureOut">
               <a:rPr lang="en-US" smtClean="0"/>
-              <a:t>11/13/2017</a:t>
+              <a:t>11/14/2017</a:t>
             </a:fld>
             <a:endParaRPr lang="en-US"/>
           </a:p>
@@ -1978,7 +1978,7 @@
           <a:p>
             <a:fld id="{95BA4CF9-B78C-45B4-9A3B-73F055770954}" type="datetimeFigureOut">
               <a:rPr lang="en-US" smtClean="0"/>
-              <a:t>11/13/2017</a:t>
+              <a:t>11/14/2017</a:t>
             </a:fld>
             <a:endParaRPr lang="en-US"/>
           </a:p>
@@ -2255,7 +2255,7 @@
           <a:p>
             <a:fld id="{95BA4CF9-B78C-45B4-9A3B-73F055770954}" type="datetimeFigureOut">
               <a:rPr lang="en-US" smtClean="0"/>
-              <a:t>11/13/2017</a:t>
+              <a:t>11/14/2017</a:t>
             </a:fld>
             <a:endParaRPr lang="en-US"/>
           </a:p>
@@ -2508,7 +2508,7 @@
           <a:p>
             <a:fld id="{95BA4CF9-B78C-45B4-9A3B-73F055770954}" type="datetimeFigureOut">
               <a:rPr lang="en-US" smtClean="0"/>
-              <a:t>11/13/2017</a:t>
+              <a:t>11/14/2017</a:t>
             </a:fld>
             <a:endParaRPr lang="en-US"/>
           </a:p>
@@ -2721,7 +2721,7 @@
           <a:p>
             <a:fld id="{95BA4CF9-B78C-45B4-9A3B-73F055770954}" type="datetimeFigureOut">
               <a:rPr lang="en-US" smtClean="0"/>
-              <a:t>11/13/2017</a:t>
+              <a:t>11/14/2017</a:t>
             </a:fld>
             <a:endParaRPr lang="en-US"/>
           </a:p>
@@ -4544,8 +4544,8 @@
         </p:nvSpPr>
         <p:spPr>
           <a:xfrm>
-            <a:off x="161925" y="1981554"/>
-            <a:ext cx="1905000" cy="533400"/>
+            <a:off x="161925" y="352779"/>
+            <a:ext cx="1905000" cy="1780822"/>
           </a:xfrm>
           <a:prstGeom prst="rect">
             <a:avLst/>
@@ -4637,9 +4637,196 @@
                   </a:outerShdw>
                 </a:effectLst>
               </a:rPr>
-              <a:t>(interface)</a:t>
+              <a:t>(interface</a:t>
+            </a:r>
+            <a:r>
+              <a:rPr lang="en-US" b="1" dirty="0" smtClean="0">
+                <a:ln w="12700">
+                  <a:solidFill>
+                    <a:schemeClr val="tx2">
+                      <a:satMod val="155000"/>
+                    </a:schemeClr>
+                  </a:solidFill>
+                  <a:prstDash val="solid"/>
+                </a:ln>
+                <a:solidFill>
+                  <a:schemeClr val="tx1"/>
+                </a:solidFill>
+                <a:effectLst>
+                  <a:outerShdw blurRad="41275" dist="20320" dir="1800000" algn="tl" rotWithShape="0">
+                    <a:srgbClr val="000000">
+                      <a:alpha val="40000"/>
+                    </a:srgbClr>
+                  </a:outerShdw>
+                </a:effectLst>
+              </a:rPr>
+              <a:t>)</a:t>
             </a:r>
             <a:endParaRPr lang="en-US" dirty="0"/>
+          </a:p>
+          <a:p>
+            <a:pPr algn="ctr"/>
+            <a:r>
+              <a:rPr lang="en-US" b="1" dirty="0" smtClean="0">
+                <a:ln w="12700">
+                  <a:solidFill>
+                    <a:schemeClr val="tx2">
+                      <a:satMod val="155000"/>
+                    </a:schemeClr>
+                  </a:solidFill>
+                  <a:prstDash val="solid"/>
+                </a:ln>
+                <a:solidFill>
+                  <a:schemeClr val="tx1"/>
+                </a:solidFill>
+                <a:effectLst>
+                  <a:outerShdw blurRad="41275" dist="20320" dir="1800000" algn="tl" rotWithShape="0">
+                    <a:srgbClr val="000000">
+                      <a:alpha val="40000"/>
+                    </a:srgbClr>
+                  </a:outerShdw>
+                </a:effectLst>
+              </a:rPr>
+              <a:t>Train, Station, </a:t>
+            </a:r>
+            <a:r>
+              <a:rPr lang="en-US" b="1" dirty="0" err="1" smtClean="0">
+                <a:ln w="12700">
+                  <a:solidFill>
+                    <a:schemeClr val="tx2">
+                      <a:satMod val="155000"/>
+                    </a:schemeClr>
+                  </a:solidFill>
+                  <a:prstDash val="solid"/>
+                </a:ln>
+                <a:solidFill>
+                  <a:schemeClr val="tx1"/>
+                </a:solidFill>
+                <a:effectLst>
+                  <a:outerShdw blurRad="41275" dist="20320" dir="1800000" algn="tl" rotWithShape="0">
+                    <a:srgbClr val="000000">
+                      <a:alpha val="40000"/>
+                    </a:srgbClr>
+                  </a:outerShdw>
+                </a:effectLst>
+              </a:rPr>
+              <a:t>RailTrack</a:t>
+            </a:r>
+            <a:r>
+              <a:rPr lang="en-US" b="1" dirty="0" smtClean="0">
+                <a:ln w="12700">
+                  <a:solidFill>
+                    <a:schemeClr val="tx2">
+                      <a:satMod val="155000"/>
+                    </a:schemeClr>
+                  </a:solidFill>
+                  <a:prstDash val="solid"/>
+                </a:ln>
+                <a:solidFill>
+                  <a:schemeClr val="tx1"/>
+                </a:solidFill>
+                <a:effectLst>
+                  <a:outerShdw blurRad="41275" dist="20320" dir="1800000" algn="tl" rotWithShape="0">
+                    <a:srgbClr val="000000">
+                      <a:alpha val="40000"/>
+                    </a:srgbClr>
+                  </a:outerShdw>
+                </a:effectLst>
+              </a:rPr>
+              <a:t>, </a:t>
+            </a:r>
+            <a:r>
+              <a:rPr lang="en-US" b="1" dirty="0" err="1" smtClean="0">
+                <a:ln w="12700">
+                  <a:solidFill>
+                    <a:schemeClr val="tx2">
+                      <a:satMod val="155000"/>
+                    </a:schemeClr>
+                  </a:solidFill>
+                  <a:prstDash val="solid"/>
+                </a:ln>
+                <a:solidFill>
+                  <a:schemeClr val="tx1"/>
+                </a:solidFill>
+                <a:effectLst>
+                  <a:outerShdw blurRad="41275" dist="20320" dir="1800000" algn="tl" rotWithShape="0">
+                    <a:srgbClr val="000000">
+                      <a:alpha val="40000"/>
+                    </a:srgbClr>
+                  </a:outerShdw>
+                </a:effectLst>
+              </a:rPr>
+              <a:t>RailSwitch</a:t>
+            </a:r>
+            <a:r>
+              <a:rPr lang="en-US" b="1" dirty="0" smtClean="0">
+                <a:ln w="12700">
+                  <a:solidFill>
+                    <a:schemeClr val="tx2">
+                      <a:satMod val="155000"/>
+                    </a:schemeClr>
+                  </a:solidFill>
+                  <a:prstDash val="solid"/>
+                </a:ln>
+                <a:solidFill>
+                  <a:schemeClr val="tx1"/>
+                </a:solidFill>
+                <a:effectLst>
+                  <a:outerShdw blurRad="41275" dist="20320" dir="1800000" algn="tl" rotWithShape="0">
+                    <a:srgbClr val="000000">
+                      <a:alpha val="40000"/>
+                    </a:srgbClr>
+                  </a:outerShdw>
+                </a:effectLst>
+              </a:rPr>
+              <a:t>,</a:t>
+            </a:r>
+          </a:p>
+          <a:p>
+            <a:pPr algn="ctr"/>
+            <a:r>
+              <a:rPr lang="en-US" b="1" dirty="0" err="1" smtClean="0">
+                <a:ln w="12700">
+                  <a:solidFill>
+                    <a:schemeClr val="tx2">
+                      <a:satMod val="155000"/>
+                    </a:schemeClr>
+                  </a:solidFill>
+                  <a:prstDash val="solid"/>
+                </a:ln>
+                <a:solidFill>
+                  <a:schemeClr val="tx1"/>
+                </a:solidFill>
+                <a:effectLst>
+                  <a:outerShdw blurRad="41275" dist="20320" dir="1800000" algn="tl" rotWithShape="0">
+                    <a:srgbClr val="000000">
+                      <a:alpha val="40000"/>
+                    </a:srgbClr>
+                  </a:outerShdw>
+                </a:effectLst>
+              </a:rPr>
+              <a:t>RailLight</a:t>
+            </a:r>
+            <a:endParaRPr lang="en-US" b="1" dirty="0" smtClean="0">
+              <a:ln w="12700">
+                <a:solidFill>
+                  <a:schemeClr val="tx2">
+                    <a:satMod val="155000"/>
+                  </a:schemeClr>
+                </a:solidFill>
+                <a:prstDash val="solid"/>
+              </a:ln>
+              <a:solidFill>
+                <a:schemeClr val="tx1"/>
+              </a:solidFill>
+              <a:effectLst>
+                <a:outerShdw blurRad="41275" dist="20320" dir="1800000" algn="tl" rotWithShape="0">
+                  <a:srgbClr val="000000">
+                    <a:alpha val="40000"/>
+                  </a:srgbClr>
+                </a:outerShdw>
+              </a:effectLst>
+            </a:endParaRPr>
           </a:p>
         </p:txBody>
       </p:sp>
@@ -4651,8 +4838,8 @@
         </p:nvSpPr>
         <p:spPr>
           <a:xfrm>
-            <a:off x="161925" y="3152011"/>
-            <a:ext cx="1905000" cy="533400"/>
+            <a:off x="161925" y="2347618"/>
+            <a:ext cx="1905000" cy="1386181"/>
           </a:xfrm>
           <a:prstGeom prst="rect">
             <a:avLst/>
@@ -4744,336 +4931,130 @@
                   </a:outerShdw>
                 </a:effectLst>
               </a:rPr>
-              <a:t>(interface)</a:t>
+              <a:t>(interface</a:t>
+            </a:r>
+            <a:r>
+              <a:rPr lang="en-US" b="1" dirty="0" smtClean="0">
+                <a:ln w="12700">
+                  <a:solidFill>
+                    <a:schemeClr val="tx2">
+                      <a:satMod val="155000"/>
+                    </a:schemeClr>
+                  </a:solidFill>
+                  <a:prstDash val="solid"/>
+                </a:ln>
+                <a:solidFill>
+                  <a:schemeClr val="tx1"/>
+                </a:solidFill>
+                <a:effectLst>
+                  <a:outerShdw blurRad="41275" dist="20320" dir="1800000" algn="tl" rotWithShape="0">
+                    <a:srgbClr val="000000">
+                      <a:alpha val="40000"/>
+                    </a:srgbClr>
+                  </a:outerShdw>
+                </a:effectLst>
+              </a:rPr>
+              <a:t>)</a:t>
+            </a:r>
+          </a:p>
+          <a:p>
+            <a:pPr algn="ctr"/>
+            <a:r>
+              <a:rPr lang="en-US" b="1" dirty="0" smtClean="0">
+                <a:ln w="12700">
+                  <a:solidFill>
+                    <a:schemeClr val="tx2">
+                      <a:satMod val="155000"/>
+                    </a:schemeClr>
+                  </a:solidFill>
+                  <a:prstDash val="solid"/>
+                </a:ln>
+                <a:solidFill>
+                  <a:schemeClr val="tx1"/>
+                </a:solidFill>
+                <a:effectLst>
+                  <a:outerShdw blurRad="41275" dist="20320" dir="1800000" algn="tl" rotWithShape="0">
+                    <a:srgbClr val="000000">
+                      <a:alpha val="40000"/>
+                    </a:srgbClr>
+                  </a:outerShdw>
+                </a:effectLst>
+              </a:rPr>
+              <a:t>Train, Station, </a:t>
+            </a:r>
+            <a:r>
+              <a:rPr lang="en-US" b="1" dirty="0" err="1" smtClean="0">
+                <a:ln w="12700">
+                  <a:solidFill>
+                    <a:schemeClr val="tx2">
+                      <a:satMod val="155000"/>
+                    </a:schemeClr>
+                  </a:solidFill>
+                  <a:prstDash val="solid"/>
+                </a:ln>
+                <a:solidFill>
+                  <a:schemeClr val="tx1"/>
+                </a:solidFill>
+                <a:effectLst>
+                  <a:outerShdw blurRad="41275" dist="20320" dir="1800000" algn="tl" rotWithShape="0">
+                    <a:srgbClr val="000000">
+                      <a:alpha val="40000"/>
+                    </a:srgbClr>
+                  </a:outerShdw>
+                </a:effectLst>
+              </a:rPr>
+              <a:t>RailTrack</a:t>
+            </a:r>
+            <a:r>
+              <a:rPr lang="en-US" b="1" dirty="0" smtClean="0">
+                <a:ln w="12700">
+                  <a:solidFill>
+                    <a:schemeClr val="tx2">
+                      <a:satMod val="155000"/>
+                    </a:schemeClr>
+                  </a:solidFill>
+                  <a:prstDash val="solid"/>
+                </a:ln>
+                <a:solidFill>
+                  <a:schemeClr val="tx1"/>
+                </a:solidFill>
+                <a:effectLst>
+                  <a:outerShdw blurRad="41275" dist="20320" dir="1800000" algn="tl" rotWithShape="0">
+                    <a:srgbClr val="000000">
+                      <a:alpha val="40000"/>
+                    </a:srgbClr>
+                  </a:outerShdw>
+                </a:effectLst>
+              </a:rPr>
+              <a:t>, </a:t>
+            </a:r>
+            <a:r>
+              <a:rPr lang="en-US" b="1" dirty="0" err="1" smtClean="0">
+                <a:ln w="12700">
+                  <a:solidFill>
+                    <a:schemeClr val="tx2">
+                      <a:satMod val="155000"/>
+                    </a:schemeClr>
+                  </a:solidFill>
+                  <a:prstDash val="solid"/>
+                </a:ln>
+                <a:solidFill>
+                  <a:schemeClr val="tx1"/>
+                </a:solidFill>
+                <a:effectLst>
+                  <a:outerShdw blurRad="41275" dist="20320" dir="1800000" algn="tl" rotWithShape="0">
+                    <a:srgbClr val="000000">
+                      <a:alpha val="40000"/>
+                    </a:srgbClr>
+                  </a:outerShdw>
+                </a:effectLst>
+              </a:rPr>
+              <a:t>RailSwitch</a:t>
             </a:r>
             <a:endParaRPr lang="en-US" dirty="0"/>
           </a:p>
         </p:txBody>
       </p:sp>
-      <p:cxnSp>
-        <p:nvCxnSpPr>
-          <p:cNvPr id="130" name="Straight Arrow Connector 129"/>
-          <p:cNvCxnSpPr>
-            <a:stCxn id="127" idx="3"/>
-            <a:endCxn id="100" idx="1"/>
-          </p:cNvCxnSpPr>
-          <p:nvPr/>
-        </p:nvCxnSpPr>
-        <p:spPr>
-          <a:xfrm flipV="1">
-            <a:off x="2066925" y="2237788"/>
-            <a:ext cx="295275" cy="10466"/>
-          </a:xfrm>
-          <a:prstGeom prst="straightConnector1">
-            <a:avLst/>
-          </a:prstGeom>
-          <a:ln>
-            <a:tailEnd type="arrow"/>
-          </a:ln>
-        </p:spPr>
-        <p:style>
-          <a:lnRef idx="1">
-            <a:schemeClr val="accent1"/>
-          </a:lnRef>
-          <a:fillRef idx="0">
-            <a:schemeClr val="accent1"/>
-          </a:fillRef>
-          <a:effectRef idx="0">
-            <a:schemeClr val="accent1"/>
-          </a:effectRef>
-          <a:fontRef idx="minor">
-            <a:schemeClr val="tx1"/>
-          </a:fontRef>
-        </p:style>
-      </p:cxnSp>
-      <p:cxnSp>
-        <p:nvCxnSpPr>
-          <p:cNvPr id="131" name="Straight Arrow Connector 130"/>
-          <p:cNvCxnSpPr>
-            <a:stCxn id="127" idx="3"/>
-            <a:endCxn id="83" idx="0"/>
-          </p:cNvCxnSpPr>
-          <p:nvPr/>
-        </p:nvCxnSpPr>
-        <p:spPr>
-          <a:xfrm flipH="1">
-            <a:off x="1114425" y="2248254"/>
-            <a:ext cx="952500" cy="2399946"/>
-          </a:xfrm>
-          <a:prstGeom prst="straightConnector1">
-            <a:avLst/>
-          </a:prstGeom>
-          <a:ln>
-            <a:tailEnd type="arrow"/>
-          </a:ln>
-        </p:spPr>
-        <p:style>
-          <a:lnRef idx="1">
-            <a:schemeClr val="accent1"/>
-          </a:lnRef>
-          <a:fillRef idx="0">
-            <a:schemeClr val="accent1"/>
-          </a:fillRef>
-          <a:effectRef idx="0">
-            <a:schemeClr val="accent1"/>
-          </a:effectRef>
-          <a:fontRef idx="minor">
-            <a:schemeClr val="tx1"/>
-          </a:fontRef>
-        </p:style>
-      </p:cxnSp>
-      <p:cxnSp>
-        <p:nvCxnSpPr>
-          <p:cNvPr id="132" name="Straight Arrow Connector 131"/>
-          <p:cNvCxnSpPr>
-            <a:stCxn id="127" idx="3"/>
-            <a:endCxn id="32" idx="0"/>
-          </p:cNvCxnSpPr>
-          <p:nvPr/>
-        </p:nvCxnSpPr>
-        <p:spPr>
-          <a:xfrm>
-            <a:off x="2066925" y="2248254"/>
-            <a:ext cx="1247775" cy="2399946"/>
-          </a:xfrm>
-          <a:prstGeom prst="straightConnector1">
-            <a:avLst/>
-          </a:prstGeom>
-          <a:ln>
-            <a:tailEnd type="arrow"/>
-          </a:ln>
-        </p:spPr>
-        <p:style>
-          <a:lnRef idx="1">
-            <a:schemeClr val="accent1"/>
-          </a:lnRef>
-          <a:fillRef idx="0">
-            <a:schemeClr val="accent1"/>
-          </a:fillRef>
-          <a:effectRef idx="0">
-            <a:schemeClr val="accent1"/>
-          </a:effectRef>
-          <a:fontRef idx="minor">
-            <a:schemeClr val="tx1"/>
-          </a:fontRef>
-        </p:style>
-      </p:cxnSp>
-      <p:cxnSp>
-        <p:nvCxnSpPr>
-          <p:cNvPr id="133" name="Straight Arrow Connector 132"/>
-          <p:cNvCxnSpPr>
-            <a:stCxn id="127" idx="3"/>
-            <a:endCxn id="49" idx="0"/>
-          </p:cNvCxnSpPr>
-          <p:nvPr/>
-        </p:nvCxnSpPr>
-        <p:spPr>
-          <a:xfrm>
-            <a:off x="2066925" y="2248254"/>
-            <a:ext cx="3495675" cy="2399946"/>
-          </a:xfrm>
-          <a:prstGeom prst="straightConnector1">
-            <a:avLst/>
-          </a:prstGeom>
-          <a:ln>
-            <a:tailEnd type="arrow"/>
-          </a:ln>
-        </p:spPr>
-        <p:style>
-          <a:lnRef idx="1">
-            <a:schemeClr val="accent1"/>
-          </a:lnRef>
-          <a:fillRef idx="0">
-            <a:schemeClr val="accent1"/>
-          </a:fillRef>
-          <a:effectRef idx="0">
-            <a:schemeClr val="accent1"/>
-          </a:effectRef>
-          <a:fontRef idx="minor">
-            <a:schemeClr val="tx1"/>
-          </a:fontRef>
-        </p:style>
-      </p:cxnSp>
-      <p:cxnSp>
-        <p:nvCxnSpPr>
-          <p:cNvPr id="134" name="Straight Arrow Connector 133"/>
-          <p:cNvCxnSpPr>
-            <a:stCxn id="127" idx="3"/>
-            <a:endCxn id="29" idx="0"/>
-          </p:cNvCxnSpPr>
-          <p:nvPr/>
-        </p:nvCxnSpPr>
-        <p:spPr>
-          <a:xfrm>
-            <a:off x="2066925" y="2248254"/>
-            <a:ext cx="5972175" cy="2399946"/>
-          </a:xfrm>
-          <a:prstGeom prst="straightConnector1">
-            <a:avLst/>
-          </a:prstGeom>
-          <a:ln>
-            <a:tailEnd type="arrow"/>
-          </a:ln>
-        </p:spPr>
-        <p:style>
-          <a:lnRef idx="1">
-            <a:schemeClr val="accent1"/>
-          </a:lnRef>
-          <a:fillRef idx="0">
-            <a:schemeClr val="accent1"/>
-          </a:fillRef>
-          <a:effectRef idx="0">
-            <a:schemeClr val="accent1"/>
-          </a:effectRef>
-          <a:fontRef idx="minor">
-            <a:schemeClr val="tx1"/>
-          </a:fontRef>
-        </p:style>
-      </p:cxnSp>
-      <p:cxnSp>
-        <p:nvCxnSpPr>
-          <p:cNvPr id="150" name="Straight Arrow Connector 149"/>
-          <p:cNvCxnSpPr>
-            <a:stCxn id="128" idx="3"/>
-            <a:endCxn id="49" idx="0"/>
-          </p:cNvCxnSpPr>
-          <p:nvPr/>
-        </p:nvCxnSpPr>
-        <p:spPr>
-          <a:xfrm>
-            <a:off x="2066925" y="3418711"/>
-            <a:ext cx="3495675" cy="1229489"/>
-          </a:xfrm>
-          <a:prstGeom prst="straightConnector1">
-            <a:avLst/>
-          </a:prstGeom>
-          <a:ln>
-            <a:tailEnd type="arrow"/>
-          </a:ln>
-        </p:spPr>
-        <p:style>
-          <a:lnRef idx="1">
-            <a:schemeClr val="accent1"/>
-          </a:lnRef>
-          <a:fillRef idx="0">
-            <a:schemeClr val="accent1"/>
-          </a:fillRef>
-          <a:effectRef idx="0">
-            <a:schemeClr val="accent1"/>
-          </a:effectRef>
-          <a:fontRef idx="minor">
-            <a:schemeClr val="tx1"/>
-          </a:fontRef>
-        </p:style>
-      </p:cxnSp>
-      <p:cxnSp>
-        <p:nvCxnSpPr>
-          <p:cNvPr id="151" name="Straight Arrow Connector 150"/>
-          <p:cNvCxnSpPr>
-            <a:stCxn id="128" idx="3"/>
-            <a:endCxn id="100" idx="1"/>
-          </p:cNvCxnSpPr>
-          <p:nvPr/>
-        </p:nvCxnSpPr>
-        <p:spPr>
-          <a:xfrm flipV="1">
-            <a:off x="2066925" y="2237788"/>
-            <a:ext cx="295275" cy="1180923"/>
-          </a:xfrm>
-          <a:prstGeom prst="straightConnector1">
-            <a:avLst/>
-          </a:prstGeom>
-          <a:ln>
-            <a:tailEnd type="arrow"/>
-          </a:ln>
-        </p:spPr>
-        <p:style>
-          <a:lnRef idx="1">
-            <a:schemeClr val="accent1"/>
-          </a:lnRef>
-          <a:fillRef idx="0">
-            <a:schemeClr val="accent1"/>
-          </a:fillRef>
-          <a:effectRef idx="0">
-            <a:schemeClr val="accent1"/>
-          </a:effectRef>
-          <a:fontRef idx="minor">
-            <a:schemeClr val="tx1"/>
-          </a:fontRef>
-        </p:style>
-      </p:cxnSp>
-      <p:cxnSp>
-        <p:nvCxnSpPr>
-          <p:cNvPr id="152" name="Straight Arrow Connector 151"/>
-          <p:cNvCxnSpPr>
-            <a:stCxn id="128" idx="2"/>
-            <a:endCxn id="32" idx="0"/>
-          </p:cNvCxnSpPr>
-          <p:nvPr/>
-        </p:nvCxnSpPr>
-        <p:spPr>
-          <a:xfrm>
-            <a:off x="1114425" y="3685411"/>
-            <a:ext cx="2200275" cy="962789"/>
-          </a:xfrm>
-          <a:prstGeom prst="straightConnector1">
-            <a:avLst/>
-          </a:prstGeom>
-          <a:ln>
-            <a:tailEnd type="arrow"/>
-          </a:ln>
-        </p:spPr>
-        <p:style>
-          <a:lnRef idx="1">
-            <a:schemeClr val="accent1"/>
-          </a:lnRef>
-          <a:fillRef idx="0">
-            <a:schemeClr val="accent1"/>
-          </a:fillRef>
-          <a:effectRef idx="0">
-            <a:schemeClr val="accent1"/>
-          </a:effectRef>
-          <a:fontRef idx="minor">
-            <a:schemeClr val="tx1"/>
-          </a:fontRef>
-        </p:style>
-      </p:cxnSp>
-      <p:cxnSp>
-        <p:nvCxnSpPr>
-          <p:cNvPr id="153" name="Straight Arrow Connector 152"/>
-          <p:cNvCxnSpPr>
-            <a:stCxn id="128" idx="2"/>
-            <a:endCxn id="83" idx="0"/>
-          </p:cNvCxnSpPr>
-          <p:nvPr/>
-        </p:nvCxnSpPr>
-        <p:spPr>
-          <a:xfrm>
-            <a:off x="1114425" y="3685411"/>
-            <a:ext cx="0" cy="962789"/>
-          </a:xfrm>
-          <a:prstGeom prst="straightConnector1">
-            <a:avLst/>
-          </a:prstGeom>
-          <a:ln>
-            <a:tailEnd type="arrow"/>
-          </a:ln>
-        </p:spPr>
-        <p:style>
-          <a:lnRef idx="1">
-            <a:schemeClr val="accent1"/>
-          </a:lnRef>
-          <a:fillRef idx="0">
-            <a:schemeClr val="accent1"/>
-          </a:fillRef>
-          <a:effectRef idx="0">
-            <a:schemeClr val="accent1"/>
-          </a:effectRef>
-          <a:fontRef idx="minor">
-            <a:schemeClr val="tx1"/>
-          </a:fontRef>
-        </p:style>
-      </p:cxnSp>
       <p:sp>
         <p:nvSpPr>
           <p:cNvPr id="164" name="Rectangle 163"/>

</xml_diff>

<commit_message>
Made new jar, made window not resizable
</commit_message>
<xml_diff>
--- a/UNM/CS351/SmartRailLab/doc/SmartRail Design Diagram.pptx
+++ b/UNM/CS351/SmartRailLab/doc/SmartRail Design Diagram.pptx
@@ -6,7 +6,6 @@
   </p:sldMasterIdLst>
   <p:sldIdLst>
     <p:sldId id="257" r:id="rId2"/>
-    <p:sldId id="256" r:id="rId3"/>
   </p:sldIdLst>
   <p:sldSz cx="9144000" cy="6858000" type="screen4x3"/>
   <p:notesSz cx="6858000" cy="9144000"/>
@@ -289,7 +288,7 @@
           <a:p>
             <a:fld id="{95BA4CF9-B78C-45B4-9A3B-73F055770954}" type="datetimeFigureOut">
               <a:rPr lang="en-US" smtClean="0"/>
-              <a:t>11/14/2017</a:t>
+              <a:t>11/15/2017</a:t>
             </a:fld>
             <a:endParaRPr lang="en-US"/>
           </a:p>
@@ -459,7 +458,7 @@
           <a:p>
             <a:fld id="{95BA4CF9-B78C-45B4-9A3B-73F055770954}" type="datetimeFigureOut">
               <a:rPr lang="en-US" smtClean="0"/>
-              <a:t>11/14/2017</a:t>
+              <a:t>11/15/2017</a:t>
             </a:fld>
             <a:endParaRPr lang="en-US"/>
           </a:p>
@@ -639,7 +638,7 @@
           <a:p>
             <a:fld id="{95BA4CF9-B78C-45B4-9A3B-73F055770954}" type="datetimeFigureOut">
               <a:rPr lang="en-US" smtClean="0"/>
-              <a:t>11/14/2017</a:t>
+              <a:t>11/15/2017</a:t>
             </a:fld>
             <a:endParaRPr lang="en-US"/>
           </a:p>
@@ -809,7 +808,7 @@
           <a:p>
             <a:fld id="{95BA4CF9-B78C-45B4-9A3B-73F055770954}" type="datetimeFigureOut">
               <a:rPr lang="en-US" smtClean="0"/>
-              <a:t>11/14/2017</a:t>
+              <a:t>11/15/2017</a:t>
             </a:fld>
             <a:endParaRPr lang="en-US"/>
           </a:p>
@@ -1055,7 +1054,7 @@
           <a:p>
             <a:fld id="{95BA4CF9-B78C-45B4-9A3B-73F055770954}" type="datetimeFigureOut">
               <a:rPr lang="en-US" smtClean="0"/>
-              <a:t>11/14/2017</a:t>
+              <a:t>11/15/2017</a:t>
             </a:fld>
             <a:endParaRPr lang="en-US"/>
           </a:p>
@@ -1343,7 +1342,7 @@
           <a:p>
             <a:fld id="{95BA4CF9-B78C-45B4-9A3B-73F055770954}" type="datetimeFigureOut">
               <a:rPr lang="en-US" smtClean="0"/>
-              <a:t>11/14/2017</a:t>
+              <a:t>11/15/2017</a:t>
             </a:fld>
             <a:endParaRPr lang="en-US"/>
           </a:p>
@@ -1765,7 +1764,7 @@
           <a:p>
             <a:fld id="{95BA4CF9-B78C-45B4-9A3B-73F055770954}" type="datetimeFigureOut">
               <a:rPr lang="en-US" smtClean="0"/>
-              <a:t>11/14/2017</a:t>
+              <a:t>11/15/2017</a:t>
             </a:fld>
             <a:endParaRPr lang="en-US"/>
           </a:p>
@@ -1883,7 +1882,7 @@
           <a:p>
             <a:fld id="{95BA4CF9-B78C-45B4-9A3B-73F055770954}" type="datetimeFigureOut">
               <a:rPr lang="en-US" smtClean="0"/>
-              <a:t>11/14/2017</a:t>
+              <a:t>11/15/2017</a:t>
             </a:fld>
             <a:endParaRPr lang="en-US"/>
           </a:p>
@@ -1978,7 +1977,7 @@
           <a:p>
             <a:fld id="{95BA4CF9-B78C-45B4-9A3B-73F055770954}" type="datetimeFigureOut">
               <a:rPr lang="en-US" smtClean="0"/>
-              <a:t>11/14/2017</a:t>
+              <a:t>11/15/2017</a:t>
             </a:fld>
             <a:endParaRPr lang="en-US"/>
           </a:p>
@@ -2255,7 +2254,7 @@
           <a:p>
             <a:fld id="{95BA4CF9-B78C-45B4-9A3B-73F055770954}" type="datetimeFigureOut">
               <a:rPr lang="en-US" smtClean="0"/>
-              <a:t>11/14/2017</a:t>
+              <a:t>11/15/2017</a:t>
             </a:fld>
             <a:endParaRPr lang="en-US"/>
           </a:p>
@@ -2508,7 +2507,7 @@
           <a:p>
             <a:fld id="{95BA4CF9-B78C-45B4-9A3B-73F055770954}" type="datetimeFigureOut">
               <a:rPr lang="en-US" smtClean="0"/>
-              <a:t>11/14/2017</a:t>
+              <a:t>11/15/2017</a:t>
             </a:fld>
             <a:endParaRPr lang="en-US"/>
           </a:p>
@@ -2721,7 +2720,7 @@
           <a:p>
             <a:fld id="{95BA4CF9-B78C-45B4-9A3B-73F055770954}" type="datetimeFigureOut">
               <a:rPr lang="en-US" smtClean="0"/>
-              <a:t>11/14/2017</a:t>
+              <a:t>11/15/2017</a:t>
             </a:fld>
             <a:endParaRPr lang="en-US"/>
           </a:p>
@@ -4637,30 +4636,7 @@
                   </a:outerShdw>
                 </a:effectLst>
               </a:rPr>
-              <a:t>(interface</a:t>
-            </a:r>
-            <a:r>
-              <a:rPr lang="en-US" b="1" dirty="0" smtClean="0">
-                <a:ln w="12700">
-                  <a:solidFill>
-                    <a:schemeClr val="tx2">
-                      <a:satMod val="155000"/>
-                    </a:schemeClr>
-                  </a:solidFill>
-                  <a:prstDash val="solid"/>
-                </a:ln>
-                <a:solidFill>
-                  <a:schemeClr val="tx1"/>
-                </a:solidFill>
-                <a:effectLst>
-                  <a:outerShdw blurRad="41275" dist="20320" dir="1800000" algn="tl" rotWithShape="0">
-                    <a:srgbClr val="000000">
-                      <a:alpha val="40000"/>
-                    </a:srgbClr>
-                  </a:outerShdw>
-                </a:effectLst>
-              </a:rPr>
-              <a:t>)</a:t>
+              <a:t>(interface)</a:t>
             </a:r>
             <a:endParaRPr lang="en-US" dirty="0"/>
           </a:p>
@@ -4931,30 +4907,7 @@
                   </a:outerShdw>
                 </a:effectLst>
               </a:rPr>
-              <a:t>(interface</a:t>
-            </a:r>
-            <a:r>
-              <a:rPr lang="en-US" b="1" dirty="0" smtClean="0">
-                <a:ln w="12700">
-                  <a:solidFill>
-                    <a:schemeClr val="tx2">
-                      <a:satMod val="155000"/>
-                    </a:schemeClr>
-                  </a:solidFill>
-                  <a:prstDash val="solid"/>
-                </a:ln>
-                <a:solidFill>
-                  <a:schemeClr val="tx1"/>
-                </a:solidFill>
-                <a:effectLst>
-                  <a:outerShdw blurRad="41275" dist="20320" dir="1800000" algn="tl" rotWithShape="0">
-                    <a:srgbClr val="000000">
-                      <a:alpha val="40000"/>
-                    </a:srgbClr>
-                  </a:outerShdw>
-                </a:effectLst>
-              </a:rPr>
-              <a:t>)</a:t>
+              <a:t>(interface)</a:t>
             </a:r>
           </a:p>
           <a:p>
@@ -5212,2494 +5165,6 @@
     <p:extLst>
       <p:ext uri="{BB962C8B-B14F-4D97-AF65-F5344CB8AC3E}">
         <p14:creationId xmlns:p14="http://schemas.microsoft.com/office/powerpoint/2010/main" val="2446018660"/>
-      </p:ext>
-    </p:extLst>
-  </p:cSld>
-  <p:clrMapOvr>
-    <a:masterClrMapping/>
-  </p:clrMapOvr>
-  <p:timing>
-    <p:tnLst>
-      <p:par>
-        <p:cTn id="1" dur="indefinite" restart="never" nodeType="tmRoot"/>
-      </p:par>
-    </p:tnLst>
-  </p:timing>
-</p:sld>
-</file>
-
-<file path=ppt/slides/slide2.xml><?xml version="1.0" encoding="utf-8"?>
-<p:sld xmlns:a="http://schemas.openxmlformats.org/drawingml/2006/main" xmlns:r="http://schemas.openxmlformats.org/officeDocument/2006/relationships" xmlns:p="http://schemas.openxmlformats.org/presentationml/2006/main">
-  <p:cSld>
-    <p:spTree>
-      <p:nvGrpSpPr>
-        <p:cNvPr id="1" name=""/>
-        <p:cNvGrpSpPr/>
-        <p:nvPr/>
-      </p:nvGrpSpPr>
-      <p:grpSpPr>
-        <a:xfrm>
-          <a:off x="0" y="0"/>
-          <a:ext cx="0" cy="0"/>
-          <a:chOff x="0" y="0"/>
-          <a:chExt cx="0" cy="0"/>
-        </a:xfrm>
-      </p:grpSpPr>
-      <p:sp>
-        <p:nvSpPr>
-          <p:cNvPr id="7" name="Subtitle 2"/>
-          <p:cNvSpPr txBox="1">
-            <a:spLocks/>
-          </p:cNvSpPr>
-          <p:nvPr/>
-        </p:nvSpPr>
-        <p:spPr>
-          <a:xfrm>
-            <a:off x="28699" y="10178"/>
-            <a:ext cx="987725" cy="668548"/>
-          </a:xfrm>
-          <a:prstGeom prst="rect">
-            <a:avLst/>
-          </a:prstGeom>
-          <a:ln>
-            <a:solidFill>
-              <a:schemeClr val="accent1"/>
-            </a:solidFill>
-          </a:ln>
-        </p:spPr>
-        <p:txBody>
-          <a:bodyPr vert="horz" lIns="91440" tIns="45720" rIns="91440" bIns="45720" rtlCol="0">
-            <a:normAutofit/>
-          </a:bodyPr>
-          <a:lstStyle>
-            <a:lvl1pPr marL="0" indent="0" algn="ctr" defTabSz="914400" rtl="0" eaLnBrk="1" latinLnBrk="0" hangingPunct="1">
-              <a:spcBef>
-                <a:spcPct val="20000"/>
-              </a:spcBef>
-              <a:buFont typeface="Arial" pitchFamily="34" charset="0"/>
-              <a:buNone/>
-              <a:defRPr sz="3200" kern="1200">
-                <a:solidFill>
-                  <a:schemeClr val="tx1">
-                    <a:tint val="75000"/>
-                  </a:schemeClr>
-                </a:solidFill>
-                <a:latin typeface="+mn-lt"/>
-                <a:ea typeface="+mn-ea"/>
-                <a:cs typeface="+mn-cs"/>
-              </a:defRPr>
-            </a:lvl1pPr>
-            <a:lvl2pPr marL="457200" indent="0" algn="ctr" defTabSz="914400" rtl="0" eaLnBrk="1" latinLnBrk="0" hangingPunct="1">
-              <a:spcBef>
-                <a:spcPct val="20000"/>
-              </a:spcBef>
-              <a:buFont typeface="Arial" pitchFamily="34" charset="0"/>
-              <a:buNone/>
-              <a:defRPr sz="2800" kern="1200">
-                <a:solidFill>
-                  <a:schemeClr val="tx1">
-                    <a:tint val="75000"/>
-                  </a:schemeClr>
-                </a:solidFill>
-                <a:latin typeface="+mn-lt"/>
-                <a:ea typeface="+mn-ea"/>
-                <a:cs typeface="+mn-cs"/>
-              </a:defRPr>
-            </a:lvl2pPr>
-            <a:lvl3pPr marL="914400" indent="0" algn="ctr" defTabSz="914400" rtl="0" eaLnBrk="1" latinLnBrk="0" hangingPunct="1">
-              <a:spcBef>
-                <a:spcPct val="20000"/>
-              </a:spcBef>
-              <a:buFont typeface="Arial" pitchFamily="34" charset="0"/>
-              <a:buNone/>
-              <a:defRPr sz="2400" kern="1200">
-                <a:solidFill>
-                  <a:schemeClr val="tx1">
-                    <a:tint val="75000"/>
-                  </a:schemeClr>
-                </a:solidFill>
-                <a:latin typeface="+mn-lt"/>
-                <a:ea typeface="+mn-ea"/>
-                <a:cs typeface="+mn-cs"/>
-              </a:defRPr>
-            </a:lvl3pPr>
-            <a:lvl4pPr marL="1371600" indent="0" algn="ctr" defTabSz="914400" rtl="0" eaLnBrk="1" latinLnBrk="0" hangingPunct="1">
-              <a:spcBef>
-                <a:spcPct val="20000"/>
-              </a:spcBef>
-              <a:buFont typeface="Arial" pitchFamily="34" charset="0"/>
-              <a:buNone/>
-              <a:defRPr sz="2000" kern="1200">
-                <a:solidFill>
-                  <a:schemeClr val="tx1">
-                    <a:tint val="75000"/>
-                  </a:schemeClr>
-                </a:solidFill>
-                <a:latin typeface="+mn-lt"/>
-                <a:ea typeface="+mn-ea"/>
-                <a:cs typeface="+mn-cs"/>
-              </a:defRPr>
-            </a:lvl4pPr>
-            <a:lvl5pPr marL="1828800" indent="0" algn="ctr" defTabSz="914400" rtl="0" eaLnBrk="1" latinLnBrk="0" hangingPunct="1">
-              <a:spcBef>
-                <a:spcPct val="20000"/>
-              </a:spcBef>
-              <a:buFont typeface="Arial" pitchFamily="34" charset="0"/>
-              <a:buNone/>
-              <a:defRPr sz="2000" kern="1200">
-                <a:solidFill>
-                  <a:schemeClr val="tx1">
-                    <a:tint val="75000"/>
-                  </a:schemeClr>
-                </a:solidFill>
-                <a:latin typeface="+mn-lt"/>
-                <a:ea typeface="+mn-ea"/>
-                <a:cs typeface="+mn-cs"/>
-              </a:defRPr>
-            </a:lvl5pPr>
-            <a:lvl6pPr marL="2286000" indent="0" algn="ctr" defTabSz="914400" rtl="0" eaLnBrk="1" latinLnBrk="0" hangingPunct="1">
-              <a:spcBef>
-                <a:spcPct val="20000"/>
-              </a:spcBef>
-              <a:buFont typeface="Arial" pitchFamily="34" charset="0"/>
-              <a:buNone/>
-              <a:defRPr sz="2000" kern="1200">
-                <a:solidFill>
-                  <a:schemeClr val="tx1">
-                    <a:tint val="75000"/>
-                  </a:schemeClr>
-                </a:solidFill>
-                <a:latin typeface="+mn-lt"/>
-                <a:ea typeface="+mn-ea"/>
-                <a:cs typeface="+mn-cs"/>
-              </a:defRPr>
-            </a:lvl6pPr>
-            <a:lvl7pPr marL="2743200" indent="0" algn="ctr" defTabSz="914400" rtl="0" eaLnBrk="1" latinLnBrk="0" hangingPunct="1">
-              <a:spcBef>
-                <a:spcPct val="20000"/>
-              </a:spcBef>
-              <a:buFont typeface="Arial" pitchFamily="34" charset="0"/>
-              <a:buNone/>
-              <a:defRPr sz="2000" kern="1200">
-                <a:solidFill>
-                  <a:schemeClr val="tx1">
-                    <a:tint val="75000"/>
-                  </a:schemeClr>
-                </a:solidFill>
-                <a:latin typeface="+mn-lt"/>
-                <a:ea typeface="+mn-ea"/>
-                <a:cs typeface="+mn-cs"/>
-              </a:defRPr>
-            </a:lvl7pPr>
-            <a:lvl8pPr marL="3200400" indent="0" algn="ctr" defTabSz="914400" rtl="0" eaLnBrk="1" latinLnBrk="0" hangingPunct="1">
-              <a:spcBef>
-                <a:spcPct val="20000"/>
-              </a:spcBef>
-              <a:buFont typeface="Arial" pitchFamily="34" charset="0"/>
-              <a:buNone/>
-              <a:defRPr sz="2000" kern="1200">
-                <a:solidFill>
-                  <a:schemeClr val="tx1">
-                    <a:tint val="75000"/>
-                  </a:schemeClr>
-                </a:solidFill>
-                <a:latin typeface="+mn-lt"/>
-                <a:ea typeface="+mn-ea"/>
-                <a:cs typeface="+mn-cs"/>
-              </a:defRPr>
-            </a:lvl8pPr>
-            <a:lvl9pPr marL="3657600" indent="0" algn="ctr" defTabSz="914400" rtl="0" eaLnBrk="1" latinLnBrk="0" hangingPunct="1">
-              <a:spcBef>
-                <a:spcPct val="20000"/>
-              </a:spcBef>
-              <a:buFont typeface="Arial" pitchFamily="34" charset="0"/>
-              <a:buNone/>
-              <a:defRPr sz="2000" kern="1200">
-                <a:solidFill>
-                  <a:schemeClr val="tx1">
-                    <a:tint val="75000"/>
-                  </a:schemeClr>
-                </a:solidFill>
-                <a:latin typeface="+mn-lt"/>
-                <a:ea typeface="+mn-ea"/>
-                <a:cs typeface="+mn-cs"/>
-              </a:defRPr>
-            </a:lvl9pPr>
-          </a:lstStyle>
-          <a:p>
-            <a:r>
-              <a:rPr lang="en-US" sz="1200" b="1" dirty="0" smtClean="0"/>
-              <a:t>Main</a:t>
-            </a:r>
-          </a:p>
-          <a:p>
-            <a:pPr algn="l"/>
-            <a:r>
-              <a:rPr lang="en-US" sz="1000" b="1" dirty="0" smtClean="0"/>
-              <a:t>+start</a:t>
-            </a:r>
-          </a:p>
-          <a:p>
-            <a:pPr algn="l"/>
-            <a:r>
-              <a:rPr lang="en-US" sz="1000" b="1" dirty="0" smtClean="0"/>
-              <a:t>+main()</a:t>
-            </a:r>
-            <a:endParaRPr lang="en-US" sz="1200" b="1" dirty="0" smtClean="0"/>
-          </a:p>
-          <a:p>
-            <a:endParaRPr lang="en-US" sz="1200" dirty="0" smtClean="0"/>
-          </a:p>
-        </p:txBody>
-      </p:sp>
-      <p:sp>
-        <p:nvSpPr>
-          <p:cNvPr id="10" name="Subtitle 2"/>
-          <p:cNvSpPr txBox="1">
-            <a:spLocks/>
-          </p:cNvSpPr>
-          <p:nvPr/>
-        </p:nvSpPr>
-        <p:spPr>
-          <a:xfrm>
-            <a:off x="1524000" y="0"/>
-            <a:ext cx="1219200" cy="1905000"/>
-          </a:xfrm>
-          <a:prstGeom prst="rect">
-            <a:avLst/>
-          </a:prstGeom>
-          <a:ln>
-            <a:solidFill>
-              <a:schemeClr val="accent1"/>
-            </a:solidFill>
-          </a:ln>
-        </p:spPr>
-        <p:txBody>
-          <a:bodyPr vert="horz" lIns="91440" tIns="45720" rIns="91440" bIns="45720" rtlCol="0">
-            <a:normAutofit lnSpcReduction="10000"/>
-          </a:bodyPr>
-          <a:lstStyle>
-            <a:lvl1pPr marL="0" indent="0" algn="ctr" defTabSz="914400" rtl="0" eaLnBrk="1" latinLnBrk="0" hangingPunct="1">
-              <a:spcBef>
-                <a:spcPct val="20000"/>
-              </a:spcBef>
-              <a:buFont typeface="Arial" pitchFamily="34" charset="0"/>
-              <a:buNone/>
-              <a:defRPr sz="3200" kern="1200">
-                <a:solidFill>
-                  <a:schemeClr val="tx1">
-                    <a:tint val="75000"/>
-                  </a:schemeClr>
-                </a:solidFill>
-                <a:latin typeface="+mn-lt"/>
-                <a:ea typeface="+mn-ea"/>
-                <a:cs typeface="+mn-cs"/>
-              </a:defRPr>
-            </a:lvl1pPr>
-            <a:lvl2pPr marL="457200" indent="0" algn="ctr" defTabSz="914400" rtl="0" eaLnBrk="1" latinLnBrk="0" hangingPunct="1">
-              <a:spcBef>
-                <a:spcPct val="20000"/>
-              </a:spcBef>
-              <a:buFont typeface="Arial" pitchFamily="34" charset="0"/>
-              <a:buNone/>
-              <a:defRPr sz="2800" kern="1200">
-                <a:solidFill>
-                  <a:schemeClr val="tx1">
-                    <a:tint val="75000"/>
-                  </a:schemeClr>
-                </a:solidFill>
-                <a:latin typeface="+mn-lt"/>
-                <a:ea typeface="+mn-ea"/>
-                <a:cs typeface="+mn-cs"/>
-              </a:defRPr>
-            </a:lvl2pPr>
-            <a:lvl3pPr marL="914400" indent="0" algn="ctr" defTabSz="914400" rtl="0" eaLnBrk="1" latinLnBrk="0" hangingPunct="1">
-              <a:spcBef>
-                <a:spcPct val="20000"/>
-              </a:spcBef>
-              <a:buFont typeface="Arial" pitchFamily="34" charset="0"/>
-              <a:buNone/>
-              <a:defRPr sz="2400" kern="1200">
-                <a:solidFill>
-                  <a:schemeClr val="tx1">
-                    <a:tint val="75000"/>
-                  </a:schemeClr>
-                </a:solidFill>
-                <a:latin typeface="+mn-lt"/>
-                <a:ea typeface="+mn-ea"/>
-                <a:cs typeface="+mn-cs"/>
-              </a:defRPr>
-            </a:lvl3pPr>
-            <a:lvl4pPr marL="1371600" indent="0" algn="ctr" defTabSz="914400" rtl="0" eaLnBrk="1" latinLnBrk="0" hangingPunct="1">
-              <a:spcBef>
-                <a:spcPct val="20000"/>
-              </a:spcBef>
-              <a:buFont typeface="Arial" pitchFamily="34" charset="0"/>
-              <a:buNone/>
-              <a:defRPr sz="2000" kern="1200">
-                <a:solidFill>
-                  <a:schemeClr val="tx1">
-                    <a:tint val="75000"/>
-                  </a:schemeClr>
-                </a:solidFill>
-                <a:latin typeface="+mn-lt"/>
-                <a:ea typeface="+mn-ea"/>
-                <a:cs typeface="+mn-cs"/>
-              </a:defRPr>
-            </a:lvl4pPr>
-            <a:lvl5pPr marL="1828800" indent="0" algn="ctr" defTabSz="914400" rtl="0" eaLnBrk="1" latinLnBrk="0" hangingPunct="1">
-              <a:spcBef>
-                <a:spcPct val="20000"/>
-              </a:spcBef>
-              <a:buFont typeface="Arial" pitchFamily="34" charset="0"/>
-              <a:buNone/>
-              <a:defRPr sz="2000" kern="1200">
-                <a:solidFill>
-                  <a:schemeClr val="tx1">
-                    <a:tint val="75000"/>
-                  </a:schemeClr>
-                </a:solidFill>
-                <a:latin typeface="+mn-lt"/>
-                <a:ea typeface="+mn-ea"/>
-                <a:cs typeface="+mn-cs"/>
-              </a:defRPr>
-            </a:lvl5pPr>
-            <a:lvl6pPr marL="2286000" indent="0" algn="ctr" defTabSz="914400" rtl="0" eaLnBrk="1" latinLnBrk="0" hangingPunct="1">
-              <a:spcBef>
-                <a:spcPct val="20000"/>
-              </a:spcBef>
-              <a:buFont typeface="Arial" pitchFamily="34" charset="0"/>
-              <a:buNone/>
-              <a:defRPr sz="2000" kern="1200">
-                <a:solidFill>
-                  <a:schemeClr val="tx1">
-                    <a:tint val="75000"/>
-                  </a:schemeClr>
-                </a:solidFill>
-                <a:latin typeface="+mn-lt"/>
-                <a:ea typeface="+mn-ea"/>
-                <a:cs typeface="+mn-cs"/>
-              </a:defRPr>
-            </a:lvl6pPr>
-            <a:lvl7pPr marL="2743200" indent="0" algn="ctr" defTabSz="914400" rtl="0" eaLnBrk="1" latinLnBrk="0" hangingPunct="1">
-              <a:spcBef>
-                <a:spcPct val="20000"/>
-              </a:spcBef>
-              <a:buFont typeface="Arial" pitchFamily="34" charset="0"/>
-              <a:buNone/>
-              <a:defRPr sz="2000" kern="1200">
-                <a:solidFill>
-                  <a:schemeClr val="tx1">
-                    <a:tint val="75000"/>
-                  </a:schemeClr>
-                </a:solidFill>
-                <a:latin typeface="+mn-lt"/>
-                <a:ea typeface="+mn-ea"/>
-                <a:cs typeface="+mn-cs"/>
-              </a:defRPr>
-            </a:lvl7pPr>
-            <a:lvl8pPr marL="3200400" indent="0" algn="ctr" defTabSz="914400" rtl="0" eaLnBrk="1" latinLnBrk="0" hangingPunct="1">
-              <a:spcBef>
-                <a:spcPct val="20000"/>
-              </a:spcBef>
-              <a:buFont typeface="Arial" pitchFamily="34" charset="0"/>
-              <a:buNone/>
-              <a:defRPr sz="2000" kern="1200">
-                <a:solidFill>
-                  <a:schemeClr val="tx1">
-                    <a:tint val="75000"/>
-                  </a:schemeClr>
-                </a:solidFill>
-                <a:latin typeface="+mn-lt"/>
-                <a:ea typeface="+mn-ea"/>
-                <a:cs typeface="+mn-cs"/>
-              </a:defRPr>
-            </a:lvl8pPr>
-            <a:lvl9pPr marL="3657600" indent="0" algn="ctr" defTabSz="914400" rtl="0" eaLnBrk="1" latinLnBrk="0" hangingPunct="1">
-              <a:spcBef>
-                <a:spcPct val="20000"/>
-              </a:spcBef>
-              <a:buFont typeface="Arial" pitchFamily="34" charset="0"/>
-              <a:buNone/>
-              <a:defRPr sz="2000" kern="1200">
-                <a:solidFill>
-                  <a:schemeClr val="tx1">
-                    <a:tint val="75000"/>
-                  </a:schemeClr>
-                </a:solidFill>
-                <a:latin typeface="+mn-lt"/>
-                <a:ea typeface="+mn-ea"/>
-                <a:cs typeface="+mn-cs"/>
-              </a:defRPr>
-            </a:lvl9pPr>
-          </a:lstStyle>
-          <a:p>
-            <a:r>
-              <a:rPr lang="en-US" sz="1200" b="1" dirty="0" smtClean="0"/>
-              <a:t>Controller</a:t>
-            </a:r>
-          </a:p>
-          <a:p>
-            <a:pPr algn="l"/>
-            <a:r>
-              <a:rPr lang="en-US" sz="1000" b="1" dirty="0" smtClean="0"/>
-              <a:t>+Controller()</a:t>
-            </a:r>
-          </a:p>
-          <a:p>
-            <a:pPr algn="l"/>
-            <a:r>
-              <a:rPr lang="en-US" sz="1000" b="1" dirty="0" smtClean="0"/>
-              <a:t>-initialize()</a:t>
-            </a:r>
-          </a:p>
-          <a:p>
-            <a:pPr algn="l"/>
-            <a:r>
-              <a:rPr lang="en-US" sz="1000" b="1" dirty="0" smtClean="0"/>
-              <a:t>-</a:t>
-            </a:r>
-            <a:r>
-              <a:rPr lang="en-US" sz="1000" b="1" dirty="0" err="1" smtClean="0"/>
-              <a:t>askGameType</a:t>
-            </a:r>
-            <a:r>
-              <a:rPr lang="en-US" sz="1000" b="1" dirty="0" smtClean="0"/>
-              <a:t>()</a:t>
-            </a:r>
-          </a:p>
-          <a:p>
-            <a:pPr algn="l"/>
-            <a:r>
-              <a:rPr lang="en-US" sz="1000" b="1" dirty="0" smtClean="0"/>
-              <a:t>-</a:t>
-            </a:r>
-            <a:r>
-              <a:rPr lang="en-US" sz="1000" b="1" dirty="0" err="1" smtClean="0"/>
-              <a:t>askLetterType</a:t>
-            </a:r>
-            <a:r>
-              <a:rPr lang="en-US" sz="1000" b="1" dirty="0" smtClean="0"/>
-              <a:t>()</a:t>
-            </a:r>
-          </a:p>
-          <a:p>
-            <a:pPr algn="l"/>
-            <a:r>
-              <a:rPr lang="en-US" sz="1000" b="1" dirty="0" smtClean="0"/>
-              <a:t>-</a:t>
-            </a:r>
-            <a:r>
-              <a:rPr lang="en-US" sz="1000" b="1" dirty="0" err="1" smtClean="0"/>
-              <a:t>canvasClicked</a:t>
-            </a:r>
-            <a:r>
-              <a:rPr lang="en-US" sz="1000" b="1" dirty="0" smtClean="0"/>
-              <a:t>()</a:t>
-            </a:r>
-          </a:p>
-          <a:p>
-            <a:pPr algn="l"/>
-            <a:r>
-              <a:rPr lang="en-US" sz="1000" b="1" dirty="0" smtClean="0"/>
-              <a:t>-</a:t>
-            </a:r>
-            <a:r>
-              <a:rPr lang="en-US" sz="1000" b="1" dirty="0" err="1" smtClean="0"/>
-              <a:t>rulesClicked</a:t>
-            </a:r>
-            <a:r>
-              <a:rPr lang="en-US" sz="1000" b="1" dirty="0" smtClean="0"/>
-              <a:t>()</a:t>
-            </a:r>
-          </a:p>
-          <a:p>
-            <a:pPr algn="l"/>
-            <a:r>
-              <a:rPr lang="en-US" sz="1000" b="1" dirty="0" smtClean="0"/>
-              <a:t>-</a:t>
-            </a:r>
-            <a:r>
-              <a:rPr lang="en-US" sz="1000" b="1" dirty="0" err="1" smtClean="0"/>
-              <a:t>aboutClicked</a:t>
-            </a:r>
-            <a:r>
-              <a:rPr lang="en-US" sz="1000" b="1" dirty="0" smtClean="0"/>
-              <a:t>()</a:t>
-            </a:r>
-          </a:p>
-          <a:p>
-            <a:pPr algn="l"/>
-            <a:r>
-              <a:rPr lang="en-US" sz="1000" b="1" dirty="0" smtClean="0"/>
-              <a:t>-</a:t>
-            </a:r>
-            <a:r>
-              <a:rPr lang="en-US" sz="1000" b="1" dirty="0" err="1" smtClean="0"/>
-              <a:t>controlsClicked</a:t>
-            </a:r>
-            <a:r>
-              <a:rPr lang="en-US" sz="1000" b="1" dirty="0" smtClean="0"/>
-              <a:t>()</a:t>
-            </a:r>
-          </a:p>
-          <a:p>
-            <a:pPr algn="l"/>
-            <a:r>
-              <a:rPr lang="en-US" sz="1000" b="1" dirty="0" smtClean="0"/>
-              <a:t>-</a:t>
-            </a:r>
-            <a:r>
-              <a:rPr lang="en-US" sz="1000" b="1" dirty="0" err="1" smtClean="0"/>
-              <a:t>openMenuItem</a:t>
-            </a:r>
-            <a:r>
-              <a:rPr lang="en-US" sz="1000" b="1" dirty="0" smtClean="0"/>
-              <a:t>()</a:t>
-            </a:r>
-          </a:p>
-          <a:p>
-            <a:endParaRPr lang="en-US" sz="1200" dirty="0" smtClean="0"/>
-          </a:p>
-        </p:txBody>
-      </p:sp>
-      <p:sp>
-        <p:nvSpPr>
-          <p:cNvPr id="11" name="Subtitle 2"/>
-          <p:cNvSpPr txBox="1">
-            <a:spLocks/>
-          </p:cNvSpPr>
-          <p:nvPr/>
-        </p:nvSpPr>
-        <p:spPr>
-          <a:xfrm>
-            <a:off x="3807033" y="12944"/>
-            <a:ext cx="1603167" cy="1968256"/>
-          </a:xfrm>
-          <a:prstGeom prst="rect">
-            <a:avLst/>
-          </a:prstGeom>
-          <a:ln>
-            <a:solidFill>
-              <a:schemeClr val="accent1"/>
-            </a:solidFill>
-          </a:ln>
-        </p:spPr>
-        <p:txBody>
-          <a:bodyPr vert="horz" lIns="91440" tIns="45720" rIns="91440" bIns="45720" rtlCol="0">
-            <a:normAutofit/>
-          </a:bodyPr>
-          <a:lstStyle>
-            <a:lvl1pPr marL="0" indent="0" algn="ctr" defTabSz="914400" rtl="0" eaLnBrk="1" latinLnBrk="0" hangingPunct="1">
-              <a:spcBef>
-                <a:spcPct val="20000"/>
-              </a:spcBef>
-              <a:buFont typeface="Arial" pitchFamily="34" charset="0"/>
-              <a:buNone/>
-              <a:defRPr sz="3200" kern="1200">
-                <a:solidFill>
-                  <a:schemeClr val="tx1">
-                    <a:tint val="75000"/>
-                  </a:schemeClr>
-                </a:solidFill>
-                <a:latin typeface="+mn-lt"/>
-                <a:ea typeface="+mn-ea"/>
-                <a:cs typeface="+mn-cs"/>
-              </a:defRPr>
-            </a:lvl1pPr>
-            <a:lvl2pPr marL="457200" indent="0" algn="ctr" defTabSz="914400" rtl="0" eaLnBrk="1" latinLnBrk="0" hangingPunct="1">
-              <a:spcBef>
-                <a:spcPct val="20000"/>
-              </a:spcBef>
-              <a:buFont typeface="Arial" pitchFamily="34" charset="0"/>
-              <a:buNone/>
-              <a:defRPr sz="2800" kern="1200">
-                <a:solidFill>
-                  <a:schemeClr val="tx1">
-                    <a:tint val="75000"/>
-                  </a:schemeClr>
-                </a:solidFill>
-                <a:latin typeface="+mn-lt"/>
-                <a:ea typeface="+mn-ea"/>
-                <a:cs typeface="+mn-cs"/>
-              </a:defRPr>
-            </a:lvl2pPr>
-            <a:lvl3pPr marL="914400" indent="0" algn="ctr" defTabSz="914400" rtl="0" eaLnBrk="1" latinLnBrk="0" hangingPunct="1">
-              <a:spcBef>
-                <a:spcPct val="20000"/>
-              </a:spcBef>
-              <a:buFont typeface="Arial" pitchFamily="34" charset="0"/>
-              <a:buNone/>
-              <a:defRPr sz="2400" kern="1200">
-                <a:solidFill>
-                  <a:schemeClr val="tx1">
-                    <a:tint val="75000"/>
-                  </a:schemeClr>
-                </a:solidFill>
-                <a:latin typeface="+mn-lt"/>
-                <a:ea typeface="+mn-ea"/>
-                <a:cs typeface="+mn-cs"/>
-              </a:defRPr>
-            </a:lvl3pPr>
-            <a:lvl4pPr marL="1371600" indent="0" algn="ctr" defTabSz="914400" rtl="0" eaLnBrk="1" latinLnBrk="0" hangingPunct="1">
-              <a:spcBef>
-                <a:spcPct val="20000"/>
-              </a:spcBef>
-              <a:buFont typeface="Arial" pitchFamily="34" charset="0"/>
-              <a:buNone/>
-              <a:defRPr sz="2000" kern="1200">
-                <a:solidFill>
-                  <a:schemeClr val="tx1">
-                    <a:tint val="75000"/>
-                  </a:schemeClr>
-                </a:solidFill>
-                <a:latin typeface="+mn-lt"/>
-                <a:ea typeface="+mn-ea"/>
-                <a:cs typeface="+mn-cs"/>
-              </a:defRPr>
-            </a:lvl4pPr>
-            <a:lvl5pPr marL="1828800" indent="0" algn="ctr" defTabSz="914400" rtl="0" eaLnBrk="1" latinLnBrk="0" hangingPunct="1">
-              <a:spcBef>
-                <a:spcPct val="20000"/>
-              </a:spcBef>
-              <a:buFont typeface="Arial" pitchFamily="34" charset="0"/>
-              <a:buNone/>
-              <a:defRPr sz="2000" kern="1200">
-                <a:solidFill>
-                  <a:schemeClr val="tx1">
-                    <a:tint val="75000"/>
-                  </a:schemeClr>
-                </a:solidFill>
-                <a:latin typeface="+mn-lt"/>
-                <a:ea typeface="+mn-ea"/>
-                <a:cs typeface="+mn-cs"/>
-              </a:defRPr>
-            </a:lvl5pPr>
-            <a:lvl6pPr marL="2286000" indent="0" algn="ctr" defTabSz="914400" rtl="0" eaLnBrk="1" latinLnBrk="0" hangingPunct="1">
-              <a:spcBef>
-                <a:spcPct val="20000"/>
-              </a:spcBef>
-              <a:buFont typeface="Arial" pitchFamily="34" charset="0"/>
-              <a:buNone/>
-              <a:defRPr sz="2000" kern="1200">
-                <a:solidFill>
-                  <a:schemeClr val="tx1">
-                    <a:tint val="75000"/>
-                  </a:schemeClr>
-                </a:solidFill>
-                <a:latin typeface="+mn-lt"/>
-                <a:ea typeface="+mn-ea"/>
-                <a:cs typeface="+mn-cs"/>
-              </a:defRPr>
-            </a:lvl6pPr>
-            <a:lvl7pPr marL="2743200" indent="0" algn="ctr" defTabSz="914400" rtl="0" eaLnBrk="1" latinLnBrk="0" hangingPunct="1">
-              <a:spcBef>
-                <a:spcPct val="20000"/>
-              </a:spcBef>
-              <a:buFont typeface="Arial" pitchFamily="34" charset="0"/>
-              <a:buNone/>
-              <a:defRPr sz="2000" kern="1200">
-                <a:solidFill>
-                  <a:schemeClr val="tx1">
-                    <a:tint val="75000"/>
-                  </a:schemeClr>
-                </a:solidFill>
-                <a:latin typeface="+mn-lt"/>
-                <a:ea typeface="+mn-ea"/>
-                <a:cs typeface="+mn-cs"/>
-              </a:defRPr>
-            </a:lvl7pPr>
-            <a:lvl8pPr marL="3200400" indent="0" algn="ctr" defTabSz="914400" rtl="0" eaLnBrk="1" latinLnBrk="0" hangingPunct="1">
-              <a:spcBef>
-                <a:spcPct val="20000"/>
-              </a:spcBef>
-              <a:buFont typeface="Arial" pitchFamily="34" charset="0"/>
-              <a:buNone/>
-              <a:defRPr sz="2000" kern="1200">
-                <a:solidFill>
-                  <a:schemeClr val="tx1">
-                    <a:tint val="75000"/>
-                  </a:schemeClr>
-                </a:solidFill>
-                <a:latin typeface="+mn-lt"/>
-                <a:ea typeface="+mn-ea"/>
-                <a:cs typeface="+mn-cs"/>
-              </a:defRPr>
-            </a:lvl8pPr>
-            <a:lvl9pPr marL="3657600" indent="0" algn="ctr" defTabSz="914400" rtl="0" eaLnBrk="1" latinLnBrk="0" hangingPunct="1">
-              <a:spcBef>
-                <a:spcPct val="20000"/>
-              </a:spcBef>
-              <a:buFont typeface="Arial" pitchFamily="34" charset="0"/>
-              <a:buNone/>
-              <a:defRPr sz="2000" kern="1200">
-                <a:solidFill>
-                  <a:schemeClr val="tx1">
-                    <a:tint val="75000"/>
-                  </a:schemeClr>
-                </a:solidFill>
-                <a:latin typeface="+mn-lt"/>
-                <a:ea typeface="+mn-ea"/>
-                <a:cs typeface="+mn-cs"/>
-              </a:defRPr>
-            </a:lvl9pPr>
-          </a:lstStyle>
-          <a:p>
-            <a:r>
-              <a:rPr lang="en-US" sz="1200" b="1" dirty="0" err="1" smtClean="0"/>
-              <a:t>GameManager</a:t>
-            </a:r>
-            <a:endParaRPr lang="en-US" sz="1200" b="1" dirty="0" smtClean="0"/>
-          </a:p>
-          <a:p>
-            <a:pPr algn="l"/>
-            <a:r>
-              <a:rPr lang="en-US" sz="1000" b="1" dirty="0" smtClean="0"/>
-              <a:t>+</a:t>
-            </a:r>
-            <a:r>
-              <a:rPr lang="en-US" sz="1000" b="1" dirty="0" err="1" smtClean="0"/>
-              <a:t>GameManager</a:t>
-            </a:r>
-            <a:r>
-              <a:rPr lang="en-US" sz="1000" b="1" dirty="0" smtClean="0"/>
-              <a:t>()</a:t>
-            </a:r>
-          </a:p>
-          <a:p>
-            <a:pPr algn="l"/>
-            <a:r>
-              <a:rPr lang="en-US" sz="1000" b="1" dirty="0" smtClean="0"/>
-              <a:t>+</a:t>
-            </a:r>
-            <a:r>
-              <a:rPr lang="en-US" sz="1000" b="1" dirty="0" err="1" smtClean="0"/>
-              <a:t>checkWord</a:t>
-            </a:r>
-            <a:r>
-              <a:rPr lang="en-US" sz="1000" b="1" dirty="0" smtClean="0"/>
-              <a:t>()</a:t>
-            </a:r>
-          </a:p>
-          <a:p>
-            <a:pPr algn="l"/>
-            <a:r>
-              <a:rPr lang="en-US" sz="1000" b="1" dirty="0" smtClean="0"/>
-              <a:t>+</a:t>
-            </a:r>
-            <a:r>
-              <a:rPr lang="en-US" sz="1000" b="1" dirty="0" err="1" smtClean="0"/>
-              <a:t>attemptSelectPiece</a:t>
-            </a:r>
-            <a:r>
-              <a:rPr lang="en-US" sz="1000" b="1" dirty="0" smtClean="0"/>
-              <a:t>()</a:t>
-            </a:r>
-          </a:p>
-          <a:p>
-            <a:pPr algn="l"/>
-            <a:r>
-              <a:rPr lang="en-US" sz="1000" b="1" dirty="0" smtClean="0"/>
-              <a:t>-</a:t>
-            </a:r>
-            <a:r>
-              <a:rPr lang="en-US" sz="1000" b="1" dirty="0" err="1" smtClean="0"/>
-              <a:t>openFile</a:t>
-            </a:r>
-            <a:r>
-              <a:rPr lang="en-US" sz="1000" b="1" dirty="0" smtClean="0"/>
-              <a:t>()</a:t>
-            </a:r>
-          </a:p>
-          <a:p>
-            <a:pPr algn="l"/>
-            <a:r>
-              <a:rPr lang="en-US" sz="1000" b="1" dirty="0" smtClean="0"/>
-              <a:t>-</a:t>
-            </a:r>
-            <a:r>
-              <a:rPr lang="en-US" sz="1000" b="1" dirty="0" err="1" smtClean="0"/>
-              <a:t>updateLabels</a:t>
-            </a:r>
-            <a:r>
-              <a:rPr lang="en-US" sz="1000" b="1" dirty="0" smtClean="0"/>
-              <a:t>()</a:t>
-            </a:r>
-          </a:p>
-          <a:p>
-            <a:pPr algn="l"/>
-            <a:r>
-              <a:rPr lang="en-US" sz="1000" b="1" dirty="0" smtClean="0"/>
-              <a:t>-</a:t>
-            </a:r>
-            <a:r>
-              <a:rPr lang="en-US" sz="1000" b="1" dirty="0" err="1" smtClean="0"/>
-              <a:t>calculateScore</a:t>
-            </a:r>
-            <a:r>
-              <a:rPr lang="en-US" sz="1000" b="1" dirty="0" smtClean="0"/>
-              <a:t>()</a:t>
-            </a:r>
-          </a:p>
-          <a:p>
-            <a:pPr algn="l"/>
-            <a:r>
-              <a:rPr lang="en-US" sz="1000" b="1" dirty="0" smtClean="0"/>
-              <a:t>-</a:t>
-            </a:r>
-            <a:r>
-              <a:rPr lang="en-US" sz="1000" b="1" dirty="0" err="1" smtClean="0"/>
-              <a:t>resetBoardAfterCheck</a:t>
-            </a:r>
-            <a:r>
-              <a:rPr lang="en-US" sz="1000" b="1" dirty="0" smtClean="0"/>
-              <a:t>()</a:t>
-            </a:r>
-          </a:p>
-          <a:p>
-            <a:pPr algn="l"/>
-            <a:r>
-              <a:rPr lang="en-US" sz="1000" b="1" dirty="0" smtClean="0"/>
-              <a:t>-</a:t>
-            </a:r>
-            <a:r>
-              <a:rPr lang="en-US" sz="1000" b="1" dirty="0" err="1" smtClean="0"/>
-              <a:t>playSound</a:t>
-            </a:r>
-            <a:r>
-              <a:rPr lang="en-US" sz="1000" b="1" dirty="0" smtClean="0"/>
-              <a:t>()</a:t>
-            </a:r>
-          </a:p>
-          <a:p>
-            <a:pPr algn="l"/>
-            <a:r>
-              <a:rPr lang="en-US" sz="1000" b="1" dirty="0" smtClean="0"/>
-              <a:t>-</a:t>
-            </a:r>
-            <a:r>
-              <a:rPr lang="en-US" sz="1000" b="1" dirty="0" err="1" smtClean="0"/>
-              <a:t>displayEndScreen</a:t>
-            </a:r>
-            <a:r>
-              <a:rPr lang="en-US" sz="1000" b="1" dirty="0" smtClean="0"/>
-              <a:t>()</a:t>
-            </a:r>
-            <a:endParaRPr lang="en-US" sz="1200" dirty="0" smtClean="0"/>
-          </a:p>
-        </p:txBody>
-      </p:sp>
-      <p:sp>
-        <p:nvSpPr>
-          <p:cNvPr id="12" name="Subtitle 2"/>
-          <p:cNvSpPr txBox="1">
-            <a:spLocks/>
-          </p:cNvSpPr>
-          <p:nvPr/>
-        </p:nvSpPr>
-        <p:spPr>
-          <a:xfrm>
-            <a:off x="6629396" y="4105275"/>
-            <a:ext cx="1142999" cy="847725"/>
-          </a:xfrm>
-          <a:prstGeom prst="rect">
-            <a:avLst/>
-          </a:prstGeom>
-          <a:ln>
-            <a:solidFill>
-              <a:schemeClr val="accent1"/>
-            </a:solidFill>
-          </a:ln>
-        </p:spPr>
-        <p:txBody>
-          <a:bodyPr vert="horz" lIns="91440" tIns="45720" rIns="91440" bIns="45720" rtlCol="0">
-            <a:normAutofit/>
-          </a:bodyPr>
-          <a:lstStyle>
-            <a:lvl1pPr marL="0" indent="0" algn="ctr" defTabSz="914400" rtl="0" eaLnBrk="1" latinLnBrk="0" hangingPunct="1">
-              <a:spcBef>
-                <a:spcPct val="20000"/>
-              </a:spcBef>
-              <a:buFont typeface="Arial" pitchFamily="34" charset="0"/>
-              <a:buNone/>
-              <a:defRPr sz="3200" kern="1200">
-                <a:solidFill>
-                  <a:schemeClr val="tx1">
-                    <a:tint val="75000"/>
-                  </a:schemeClr>
-                </a:solidFill>
-                <a:latin typeface="+mn-lt"/>
-                <a:ea typeface="+mn-ea"/>
-                <a:cs typeface="+mn-cs"/>
-              </a:defRPr>
-            </a:lvl1pPr>
-            <a:lvl2pPr marL="457200" indent="0" algn="ctr" defTabSz="914400" rtl="0" eaLnBrk="1" latinLnBrk="0" hangingPunct="1">
-              <a:spcBef>
-                <a:spcPct val="20000"/>
-              </a:spcBef>
-              <a:buFont typeface="Arial" pitchFamily="34" charset="0"/>
-              <a:buNone/>
-              <a:defRPr sz="2800" kern="1200">
-                <a:solidFill>
-                  <a:schemeClr val="tx1">
-                    <a:tint val="75000"/>
-                  </a:schemeClr>
-                </a:solidFill>
-                <a:latin typeface="+mn-lt"/>
-                <a:ea typeface="+mn-ea"/>
-                <a:cs typeface="+mn-cs"/>
-              </a:defRPr>
-            </a:lvl2pPr>
-            <a:lvl3pPr marL="914400" indent="0" algn="ctr" defTabSz="914400" rtl="0" eaLnBrk="1" latinLnBrk="0" hangingPunct="1">
-              <a:spcBef>
-                <a:spcPct val="20000"/>
-              </a:spcBef>
-              <a:buFont typeface="Arial" pitchFamily="34" charset="0"/>
-              <a:buNone/>
-              <a:defRPr sz="2400" kern="1200">
-                <a:solidFill>
-                  <a:schemeClr val="tx1">
-                    <a:tint val="75000"/>
-                  </a:schemeClr>
-                </a:solidFill>
-                <a:latin typeface="+mn-lt"/>
-                <a:ea typeface="+mn-ea"/>
-                <a:cs typeface="+mn-cs"/>
-              </a:defRPr>
-            </a:lvl3pPr>
-            <a:lvl4pPr marL="1371600" indent="0" algn="ctr" defTabSz="914400" rtl="0" eaLnBrk="1" latinLnBrk="0" hangingPunct="1">
-              <a:spcBef>
-                <a:spcPct val="20000"/>
-              </a:spcBef>
-              <a:buFont typeface="Arial" pitchFamily="34" charset="0"/>
-              <a:buNone/>
-              <a:defRPr sz="2000" kern="1200">
-                <a:solidFill>
-                  <a:schemeClr val="tx1">
-                    <a:tint val="75000"/>
-                  </a:schemeClr>
-                </a:solidFill>
-                <a:latin typeface="+mn-lt"/>
-                <a:ea typeface="+mn-ea"/>
-                <a:cs typeface="+mn-cs"/>
-              </a:defRPr>
-            </a:lvl4pPr>
-            <a:lvl5pPr marL="1828800" indent="0" algn="ctr" defTabSz="914400" rtl="0" eaLnBrk="1" latinLnBrk="0" hangingPunct="1">
-              <a:spcBef>
-                <a:spcPct val="20000"/>
-              </a:spcBef>
-              <a:buFont typeface="Arial" pitchFamily="34" charset="0"/>
-              <a:buNone/>
-              <a:defRPr sz="2000" kern="1200">
-                <a:solidFill>
-                  <a:schemeClr val="tx1">
-                    <a:tint val="75000"/>
-                  </a:schemeClr>
-                </a:solidFill>
-                <a:latin typeface="+mn-lt"/>
-                <a:ea typeface="+mn-ea"/>
-                <a:cs typeface="+mn-cs"/>
-              </a:defRPr>
-            </a:lvl5pPr>
-            <a:lvl6pPr marL="2286000" indent="0" algn="ctr" defTabSz="914400" rtl="0" eaLnBrk="1" latinLnBrk="0" hangingPunct="1">
-              <a:spcBef>
-                <a:spcPct val="20000"/>
-              </a:spcBef>
-              <a:buFont typeface="Arial" pitchFamily="34" charset="0"/>
-              <a:buNone/>
-              <a:defRPr sz="2000" kern="1200">
-                <a:solidFill>
-                  <a:schemeClr val="tx1">
-                    <a:tint val="75000"/>
-                  </a:schemeClr>
-                </a:solidFill>
-                <a:latin typeface="+mn-lt"/>
-                <a:ea typeface="+mn-ea"/>
-                <a:cs typeface="+mn-cs"/>
-              </a:defRPr>
-            </a:lvl6pPr>
-            <a:lvl7pPr marL="2743200" indent="0" algn="ctr" defTabSz="914400" rtl="0" eaLnBrk="1" latinLnBrk="0" hangingPunct="1">
-              <a:spcBef>
-                <a:spcPct val="20000"/>
-              </a:spcBef>
-              <a:buFont typeface="Arial" pitchFamily="34" charset="0"/>
-              <a:buNone/>
-              <a:defRPr sz="2000" kern="1200">
-                <a:solidFill>
-                  <a:schemeClr val="tx1">
-                    <a:tint val="75000"/>
-                  </a:schemeClr>
-                </a:solidFill>
-                <a:latin typeface="+mn-lt"/>
-                <a:ea typeface="+mn-ea"/>
-                <a:cs typeface="+mn-cs"/>
-              </a:defRPr>
-            </a:lvl7pPr>
-            <a:lvl8pPr marL="3200400" indent="0" algn="ctr" defTabSz="914400" rtl="0" eaLnBrk="1" latinLnBrk="0" hangingPunct="1">
-              <a:spcBef>
-                <a:spcPct val="20000"/>
-              </a:spcBef>
-              <a:buFont typeface="Arial" pitchFamily="34" charset="0"/>
-              <a:buNone/>
-              <a:defRPr sz="2000" kern="1200">
-                <a:solidFill>
-                  <a:schemeClr val="tx1">
-                    <a:tint val="75000"/>
-                  </a:schemeClr>
-                </a:solidFill>
-                <a:latin typeface="+mn-lt"/>
-                <a:ea typeface="+mn-ea"/>
-                <a:cs typeface="+mn-cs"/>
-              </a:defRPr>
-            </a:lvl8pPr>
-            <a:lvl9pPr marL="3657600" indent="0" algn="ctr" defTabSz="914400" rtl="0" eaLnBrk="1" latinLnBrk="0" hangingPunct="1">
-              <a:spcBef>
-                <a:spcPct val="20000"/>
-              </a:spcBef>
-              <a:buFont typeface="Arial" pitchFamily="34" charset="0"/>
-              <a:buNone/>
-              <a:defRPr sz="2000" kern="1200">
-                <a:solidFill>
-                  <a:schemeClr val="tx1">
-                    <a:tint val="75000"/>
-                  </a:schemeClr>
-                </a:solidFill>
-                <a:latin typeface="+mn-lt"/>
-                <a:ea typeface="+mn-ea"/>
-                <a:cs typeface="+mn-cs"/>
-              </a:defRPr>
-            </a:lvl9pPr>
-          </a:lstStyle>
-          <a:p>
-            <a:r>
-              <a:rPr lang="en-US" sz="1200" b="1" dirty="0" err="1" smtClean="0"/>
-              <a:t>BoggleDie</a:t>
-            </a:r>
-            <a:endParaRPr lang="en-US" sz="1200" b="1" dirty="0" smtClean="0"/>
-          </a:p>
-          <a:p>
-            <a:pPr algn="l"/>
-            <a:r>
-              <a:rPr lang="en-US" sz="1000" b="1" dirty="0" smtClean="0"/>
-              <a:t>+</a:t>
-            </a:r>
-            <a:r>
-              <a:rPr lang="en-US" sz="1000" b="1" dirty="0" err="1" smtClean="0"/>
-              <a:t>BoggleDie</a:t>
-            </a:r>
-            <a:r>
-              <a:rPr lang="en-US" sz="1000" b="1" dirty="0" smtClean="0"/>
-              <a:t>()</a:t>
-            </a:r>
-          </a:p>
-          <a:p>
-            <a:pPr algn="l"/>
-            <a:r>
-              <a:rPr lang="en-US" sz="1000" b="1" dirty="0" smtClean="0"/>
-              <a:t>+</a:t>
-            </a:r>
-            <a:r>
-              <a:rPr lang="en-US" sz="1000" b="1" dirty="0" err="1" smtClean="0"/>
-              <a:t>rollDie</a:t>
-            </a:r>
-            <a:r>
-              <a:rPr lang="en-US" sz="1000" b="1" dirty="0" smtClean="0"/>
-              <a:t>()</a:t>
-            </a:r>
-          </a:p>
-          <a:p>
-            <a:pPr algn="l"/>
-            <a:r>
-              <a:rPr lang="en-US" sz="1000" b="1" dirty="0" smtClean="0"/>
-              <a:t>-</a:t>
-            </a:r>
-            <a:r>
-              <a:rPr lang="en-US" sz="1000" b="1" dirty="0" err="1" smtClean="0"/>
-              <a:t>addDieFaces</a:t>
-            </a:r>
-            <a:r>
-              <a:rPr lang="en-US" sz="1000" b="1" dirty="0" smtClean="0"/>
-              <a:t>()</a:t>
-            </a:r>
-          </a:p>
-          <a:p>
-            <a:pPr algn="l"/>
-            <a:endParaRPr lang="en-US" sz="1200" b="1" dirty="0" smtClean="0"/>
-          </a:p>
-          <a:p>
-            <a:pPr algn="l"/>
-            <a:endParaRPr lang="en-US" sz="1200" b="1" dirty="0" smtClean="0"/>
-          </a:p>
-          <a:p>
-            <a:endParaRPr lang="en-US" sz="1200" dirty="0" smtClean="0"/>
-          </a:p>
-        </p:txBody>
-      </p:sp>
-      <p:sp>
-        <p:nvSpPr>
-          <p:cNvPr id="13" name="Subtitle 2"/>
-          <p:cNvSpPr txBox="1">
-            <a:spLocks/>
-          </p:cNvSpPr>
-          <p:nvPr/>
-        </p:nvSpPr>
-        <p:spPr>
-          <a:xfrm>
-            <a:off x="6095999" y="2078901"/>
-            <a:ext cx="2209799" cy="1273899"/>
-          </a:xfrm>
-          <a:prstGeom prst="rect">
-            <a:avLst/>
-          </a:prstGeom>
-          <a:ln>
-            <a:solidFill>
-              <a:schemeClr val="accent1"/>
-            </a:solidFill>
-          </a:ln>
-        </p:spPr>
-        <p:txBody>
-          <a:bodyPr vert="horz" lIns="91440" tIns="45720" rIns="91440" bIns="45720" rtlCol="0">
-            <a:normAutofit/>
-          </a:bodyPr>
-          <a:lstStyle>
-            <a:lvl1pPr marL="0" indent="0" algn="ctr" defTabSz="914400" rtl="0" eaLnBrk="1" latinLnBrk="0" hangingPunct="1">
-              <a:spcBef>
-                <a:spcPct val="20000"/>
-              </a:spcBef>
-              <a:buFont typeface="Arial" pitchFamily="34" charset="0"/>
-              <a:buNone/>
-              <a:defRPr sz="3200" kern="1200">
-                <a:solidFill>
-                  <a:schemeClr val="tx1">
-                    <a:tint val="75000"/>
-                  </a:schemeClr>
-                </a:solidFill>
-                <a:latin typeface="+mn-lt"/>
-                <a:ea typeface="+mn-ea"/>
-                <a:cs typeface="+mn-cs"/>
-              </a:defRPr>
-            </a:lvl1pPr>
-            <a:lvl2pPr marL="457200" indent="0" algn="ctr" defTabSz="914400" rtl="0" eaLnBrk="1" latinLnBrk="0" hangingPunct="1">
-              <a:spcBef>
-                <a:spcPct val="20000"/>
-              </a:spcBef>
-              <a:buFont typeface="Arial" pitchFamily="34" charset="0"/>
-              <a:buNone/>
-              <a:defRPr sz="2800" kern="1200">
-                <a:solidFill>
-                  <a:schemeClr val="tx1">
-                    <a:tint val="75000"/>
-                  </a:schemeClr>
-                </a:solidFill>
-                <a:latin typeface="+mn-lt"/>
-                <a:ea typeface="+mn-ea"/>
-                <a:cs typeface="+mn-cs"/>
-              </a:defRPr>
-            </a:lvl2pPr>
-            <a:lvl3pPr marL="914400" indent="0" algn="ctr" defTabSz="914400" rtl="0" eaLnBrk="1" latinLnBrk="0" hangingPunct="1">
-              <a:spcBef>
-                <a:spcPct val="20000"/>
-              </a:spcBef>
-              <a:buFont typeface="Arial" pitchFamily="34" charset="0"/>
-              <a:buNone/>
-              <a:defRPr sz="2400" kern="1200">
-                <a:solidFill>
-                  <a:schemeClr val="tx1">
-                    <a:tint val="75000"/>
-                  </a:schemeClr>
-                </a:solidFill>
-                <a:latin typeface="+mn-lt"/>
-                <a:ea typeface="+mn-ea"/>
-                <a:cs typeface="+mn-cs"/>
-              </a:defRPr>
-            </a:lvl3pPr>
-            <a:lvl4pPr marL="1371600" indent="0" algn="ctr" defTabSz="914400" rtl="0" eaLnBrk="1" latinLnBrk="0" hangingPunct="1">
-              <a:spcBef>
-                <a:spcPct val="20000"/>
-              </a:spcBef>
-              <a:buFont typeface="Arial" pitchFamily="34" charset="0"/>
-              <a:buNone/>
-              <a:defRPr sz="2000" kern="1200">
-                <a:solidFill>
-                  <a:schemeClr val="tx1">
-                    <a:tint val="75000"/>
-                  </a:schemeClr>
-                </a:solidFill>
-                <a:latin typeface="+mn-lt"/>
-                <a:ea typeface="+mn-ea"/>
-                <a:cs typeface="+mn-cs"/>
-              </a:defRPr>
-            </a:lvl4pPr>
-            <a:lvl5pPr marL="1828800" indent="0" algn="ctr" defTabSz="914400" rtl="0" eaLnBrk="1" latinLnBrk="0" hangingPunct="1">
-              <a:spcBef>
-                <a:spcPct val="20000"/>
-              </a:spcBef>
-              <a:buFont typeface="Arial" pitchFamily="34" charset="0"/>
-              <a:buNone/>
-              <a:defRPr sz="2000" kern="1200">
-                <a:solidFill>
-                  <a:schemeClr val="tx1">
-                    <a:tint val="75000"/>
-                  </a:schemeClr>
-                </a:solidFill>
-                <a:latin typeface="+mn-lt"/>
-                <a:ea typeface="+mn-ea"/>
-                <a:cs typeface="+mn-cs"/>
-              </a:defRPr>
-            </a:lvl5pPr>
-            <a:lvl6pPr marL="2286000" indent="0" algn="ctr" defTabSz="914400" rtl="0" eaLnBrk="1" latinLnBrk="0" hangingPunct="1">
-              <a:spcBef>
-                <a:spcPct val="20000"/>
-              </a:spcBef>
-              <a:buFont typeface="Arial" pitchFamily="34" charset="0"/>
-              <a:buNone/>
-              <a:defRPr sz="2000" kern="1200">
-                <a:solidFill>
-                  <a:schemeClr val="tx1">
-                    <a:tint val="75000"/>
-                  </a:schemeClr>
-                </a:solidFill>
-                <a:latin typeface="+mn-lt"/>
-                <a:ea typeface="+mn-ea"/>
-                <a:cs typeface="+mn-cs"/>
-              </a:defRPr>
-            </a:lvl6pPr>
-            <a:lvl7pPr marL="2743200" indent="0" algn="ctr" defTabSz="914400" rtl="0" eaLnBrk="1" latinLnBrk="0" hangingPunct="1">
-              <a:spcBef>
-                <a:spcPct val="20000"/>
-              </a:spcBef>
-              <a:buFont typeface="Arial" pitchFamily="34" charset="0"/>
-              <a:buNone/>
-              <a:defRPr sz="2000" kern="1200">
-                <a:solidFill>
-                  <a:schemeClr val="tx1">
-                    <a:tint val="75000"/>
-                  </a:schemeClr>
-                </a:solidFill>
-                <a:latin typeface="+mn-lt"/>
-                <a:ea typeface="+mn-ea"/>
-                <a:cs typeface="+mn-cs"/>
-              </a:defRPr>
-            </a:lvl7pPr>
-            <a:lvl8pPr marL="3200400" indent="0" algn="ctr" defTabSz="914400" rtl="0" eaLnBrk="1" latinLnBrk="0" hangingPunct="1">
-              <a:spcBef>
-                <a:spcPct val="20000"/>
-              </a:spcBef>
-              <a:buFont typeface="Arial" pitchFamily="34" charset="0"/>
-              <a:buNone/>
-              <a:defRPr sz="2000" kern="1200">
-                <a:solidFill>
-                  <a:schemeClr val="tx1">
-                    <a:tint val="75000"/>
-                  </a:schemeClr>
-                </a:solidFill>
-                <a:latin typeface="+mn-lt"/>
-                <a:ea typeface="+mn-ea"/>
-                <a:cs typeface="+mn-cs"/>
-              </a:defRPr>
-            </a:lvl8pPr>
-            <a:lvl9pPr marL="3657600" indent="0" algn="ctr" defTabSz="914400" rtl="0" eaLnBrk="1" latinLnBrk="0" hangingPunct="1">
-              <a:spcBef>
-                <a:spcPct val="20000"/>
-              </a:spcBef>
-              <a:buFont typeface="Arial" pitchFamily="34" charset="0"/>
-              <a:buNone/>
-              <a:defRPr sz="2000" kern="1200">
-                <a:solidFill>
-                  <a:schemeClr val="tx1">
-                    <a:tint val="75000"/>
-                  </a:schemeClr>
-                </a:solidFill>
-                <a:latin typeface="+mn-lt"/>
-                <a:ea typeface="+mn-ea"/>
-                <a:cs typeface="+mn-cs"/>
-              </a:defRPr>
-            </a:lvl9pPr>
-          </a:lstStyle>
-          <a:p>
-            <a:r>
-              <a:rPr lang="en-US" sz="1200" b="1" dirty="0" err="1" smtClean="0"/>
-              <a:t>BoggleDieSet</a:t>
-            </a:r>
-            <a:endParaRPr lang="en-US" sz="1200" b="1" dirty="0" smtClean="0"/>
-          </a:p>
-          <a:p>
-            <a:pPr algn="l"/>
-            <a:r>
-              <a:rPr lang="en-US" sz="1000" b="1" dirty="0" smtClean="0"/>
-              <a:t>+</a:t>
-            </a:r>
-            <a:r>
-              <a:rPr lang="en-US" sz="1000" b="1" dirty="0" err="1" smtClean="0"/>
-              <a:t>BoggleDieSet</a:t>
-            </a:r>
-            <a:r>
-              <a:rPr lang="en-US" sz="1000" b="1" dirty="0" smtClean="0"/>
-              <a:t>()</a:t>
-            </a:r>
-          </a:p>
-          <a:p>
-            <a:pPr algn="l"/>
-            <a:r>
-              <a:rPr lang="en-US" sz="1000" b="1" dirty="0" smtClean="0"/>
-              <a:t>+</a:t>
-            </a:r>
-            <a:r>
-              <a:rPr lang="en-US" sz="1000" b="1" dirty="0" err="1" smtClean="0"/>
-              <a:t>rollTheDice</a:t>
-            </a:r>
-            <a:r>
-              <a:rPr lang="en-US" sz="1000" b="1" dirty="0" smtClean="0"/>
-              <a:t>()</a:t>
-            </a:r>
-          </a:p>
-          <a:p>
-            <a:pPr algn="l"/>
-            <a:r>
-              <a:rPr lang="en-US" sz="1000" b="1" dirty="0" smtClean="0"/>
-              <a:t>-</a:t>
-            </a:r>
-            <a:r>
-              <a:rPr lang="en-US" sz="1000" b="1" dirty="0" err="1" smtClean="0"/>
-              <a:t>makeBoggleSet</a:t>
-            </a:r>
-            <a:r>
-              <a:rPr lang="en-US" sz="1000" b="1" dirty="0" smtClean="0"/>
-              <a:t>()</a:t>
-            </a:r>
-          </a:p>
-          <a:p>
-            <a:pPr algn="l"/>
-            <a:r>
-              <a:rPr lang="en-US" sz="1000" b="1" dirty="0" smtClean="0"/>
-              <a:t>-</a:t>
-            </a:r>
-            <a:r>
-              <a:rPr lang="en-US" sz="1000" b="1" dirty="0" err="1" smtClean="0"/>
-              <a:t>makeBigBoggleSet</a:t>
-            </a:r>
-            <a:r>
-              <a:rPr lang="en-US" sz="1000" b="1" dirty="0" smtClean="0"/>
-              <a:t>()</a:t>
-            </a:r>
-          </a:p>
-          <a:p>
-            <a:pPr algn="l"/>
-            <a:r>
-              <a:rPr lang="en-US" sz="1000" b="1" dirty="0" smtClean="0"/>
-              <a:t>-</a:t>
-            </a:r>
-            <a:r>
-              <a:rPr lang="en-US" sz="1000" b="1" dirty="0" err="1" smtClean="0"/>
-              <a:t>makeSuperBigBoggleSet</a:t>
-            </a:r>
-            <a:r>
-              <a:rPr lang="en-US" sz="1000" b="1" dirty="0" smtClean="0"/>
-              <a:t>()</a:t>
-            </a:r>
-            <a:endParaRPr lang="en-US" sz="1200" b="1" dirty="0" smtClean="0"/>
-          </a:p>
-          <a:p>
-            <a:endParaRPr lang="en-US" sz="1200" dirty="0" smtClean="0"/>
-          </a:p>
-        </p:txBody>
-      </p:sp>
-      <p:sp>
-        <p:nvSpPr>
-          <p:cNvPr id="14" name="Subtitle 2"/>
-          <p:cNvSpPr txBox="1">
-            <a:spLocks/>
-          </p:cNvSpPr>
-          <p:nvPr/>
-        </p:nvSpPr>
-        <p:spPr>
-          <a:xfrm>
-            <a:off x="6248400" y="31026"/>
-            <a:ext cx="1904999" cy="1295400"/>
-          </a:xfrm>
-          <a:prstGeom prst="rect">
-            <a:avLst/>
-          </a:prstGeom>
-          <a:ln>
-            <a:solidFill>
-              <a:schemeClr val="accent1"/>
-            </a:solidFill>
-          </a:ln>
-        </p:spPr>
-        <p:txBody>
-          <a:bodyPr vert="horz" lIns="91440" tIns="45720" rIns="91440" bIns="45720" rtlCol="0">
-            <a:normAutofit/>
-          </a:bodyPr>
-          <a:lstStyle>
-            <a:lvl1pPr marL="0" indent="0" algn="ctr" defTabSz="914400" rtl="0" eaLnBrk="1" latinLnBrk="0" hangingPunct="1">
-              <a:spcBef>
-                <a:spcPct val="20000"/>
-              </a:spcBef>
-              <a:buFont typeface="Arial" pitchFamily="34" charset="0"/>
-              <a:buNone/>
-              <a:defRPr sz="3200" kern="1200">
-                <a:solidFill>
-                  <a:schemeClr val="tx1">
-                    <a:tint val="75000"/>
-                  </a:schemeClr>
-                </a:solidFill>
-                <a:latin typeface="+mn-lt"/>
-                <a:ea typeface="+mn-ea"/>
-                <a:cs typeface="+mn-cs"/>
-              </a:defRPr>
-            </a:lvl1pPr>
-            <a:lvl2pPr marL="457200" indent="0" algn="ctr" defTabSz="914400" rtl="0" eaLnBrk="1" latinLnBrk="0" hangingPunct="1">
-              <a:spcBef>
-                <a:spcPct val="20000"/>
-              </a:spcBef>
-              <a:buFont typeface="Arial" pitchFamily="34" charset="0"/>
-              <a:buNone/>
-              <a:defRPr sz="2800" kern="1200">
-                <a:solidFill>
-                  <a:schemeClr val="tx1">
-                    <a:tint val="75000"/>
-                  </a:schemeClr>
-                </a:solidFill>
-                <a:latin typeface="+mn-lt"/>
-                <a:ea typeface="+mn-ea"/>
-                <a:cs typeface="+mn-cs"/>
-              </a:defRPr>
-            </a:lvl2pPr>
-            <a:lvl3pPr marL="914400" indent="0" algn="ctr" defTabSz="914400" rtl="0" eaLnBrk="1" latinLnBrk="0" hangingPunct="1">
-              <a:spcBef>
-                <a:spcPct val="20000"/>
-              </a:spcBef>
-              <a:buFont typeface="Arial" pitchFamily="34" charset="0"/>
-              <a:buNone/>
-              <a:defRPr sz="2400" kern="1200">
-                <a:solidFill>
-                  <a:schemeClr val="tx1">
-                    <a:tint val="75000"/>
-                  </a:schemeClr>
-                </a:solidFill>
-                <a:latin typeface="+mn-lt"/>
-                <a:ea typeface="+mn-ea"/>
-                <a:cs typeface="+mn-cs"/>
-              </a:defRPr>
-            </a:lvl3pPr>
-            <a:lvl4pPr marL="1371600" indent="0" algn="ctr" defTabSz="914400" rtl="0" eaLnBrk="1" latinLnBrk="0" hangingPunct="1">
-              <a:spcBef>
-                <a:spcPct val="20000"/>
-              </a:spcBef>
-              <a:buFont typeface="Arial" pitchFamily="34" charset="0"/>
-              <a:buNone/>
-              <a:defRPr sz="2000" kern="1200">
-                <a:solidFill>
-                  <a:schemeClr val="tx1">
-                    <a:tint val="75000"/>
-                  </a:schemeClr>
-                </a:solidFill>
-                <a:latin typeface="+mn-lt"/>
-                <a:ea typeface="+mn-ea"/>
-                <a:cs typeface="+mn-cs"/>
-              </a:defRPr>
-            </a:lvl4pPr>
-            <a:lvl5pPr marL="1828800" indent="0" algn="ctr" defTabSz="914400" rtl="0" eaLnBrk="1" latinLnBrk="0" hangingPunct="1">
-              <a:spcBef>
-                <a:spcPct val="20000"/>
-              </a:spcBef>
-              <a:buFont typeface="Arial" pitchFamily="34" charset="0"/>
-              <a:buNone/>
-              <a:defRPr sz="2000" kern="1200">
-                <a:solidFill>
-                  <a:schemeClr val="tx1">
-                    <a:tint val="75000"/>
-                  </a:schemeClr>
-                </a:solidFill>
-                <a:latin typeface="+mn-lt"/>
-                <a:ea typeface="+mn-ea"/>
-                <a:cs typeface="+mn-cs"/>
-              </a:defRPr>
-            </a:lvl5pPr>
-            <a:lvl6pPr marL="2286000" indent="0" algn="ctr" defTabSz="914400" rtl="0" eaLnBrk="1" latinLnBrk="0" hangingPunct="1">
-              <a:spcBef>
-                <a:spcPct val="20000"/>
-              </a:spcBef>
-              <a:buFont typeface="Arial" pitchFamily="34" charset="0"/>
-              <a:buNone/>
-              <a:defRPr sz="2000" kern="1200">
-                <a:solidFill>
-                  <a:schemeClr val="tx1">
-                    <a:tint val="75000"/>
-                  </a:schemeClr>
-                </a:solidFill>
-                <a:latin typeface="+mn-lt"/>
-                <a:ea typeface="+mn-ea"/>
-                <a:cs typeface="+mn-cs"/>
-              </a:defRPr>
-            </a:lvl6pPr>
-            <a:lvl7pPr marL="2743200" indent="0" algn="ctr" defTabSz="914400" rtl="0" eaLnBrk="1" latinLnBrk="0" hangingPunct="1">
-              <a:spcBef>
-                <a:spcPct val="20000"/>
-              </a:spcBef>
-              <a:buFont typeface="Arial" pitchFamily="34" charset="0"/>
-              <a:buNone/>
-              <a:defRPr sz="2000" kern="1200">
-                <a:solidFill>
-                  <a:schemeClr val="tx1">
-                    <a:tint val="75000"/>
-                  </a:schemeClr>
-                </a:solidFill>
-                <a:latin typeface="+mn-lt"/>
-                <a:ea typeface="+mn-ea"/>
-                <a:cs typeface="+mn-cs"/>
-              </a:defRPr>
-            </a:lvl7pPr>
-            <a:lvl8pPr marL="3200400" indent="0" algn="ctr" defTabSz="914400" rtl="0" eaLnBrk="1" latinLnBrk="0" hangingPunct="1">
-              <a:spcBef>
-                <a:spcPct val="20000"/>
-              </a:spcBef>
-              <a:buFont typeface="Arial" pitchFamily="34" charset="0"/>
-              <a:buNone/>
-              <a:defRPr sz="2000" kern="1200">
-                <a:solidFill>
-                  <a:schemeClr val="tx1">
-                    <a:tint val="75000"/>
-                  </a:schemeClr>
-                </a:solidFill>
-                <a:latin typeface="+mn-lt"/>
-                <a:ea typeface="+mn-ea"/>
-                <a:cs typeface="+mn-cs"/>
-              </a:defRPr>
-            </a:lvl8pPr>
-            <a:lvl9pPr marL="3657600" indent="0" algn="ctr" defTabSz="914400" rtl="0" eaLnBrk="1" latinLnBrk="0" hangingPunct="1">
-              <a:spcBef>
-                <a:spcPct val="20000"/>
-              </a:spcBef>
-              <a:buFont typeface="Arial" pitchFamily="34" charset="0"/>
-              <a:buNone/>
-              <a:defRPr sz="2000" kern="1200">
-                <a:solidFill>
-                  <a:schemeClr val="tx1">
-                    <a:tint val="75000"/>
-                  </a:schemeClr>
-                </a:solidFill>
-                <a:latin typeface="+mn-lt"/>
-                <a:ea typeface="+mn-ea"/>
-                <a:cs typeface="+mn-cs"/>
-              </a:defRPr>
-            </a:lvl9pPr>
-          </a:lstStyle>
-          <a:p>
-            <a:r>
-              <a:rPr lang="en-US" sz="1200" b="1" dirty="0" err="1" smtClean="0"/>
-              <a:t>BoardSetup</a:t>
-            </a:r>
-            <a:endParaRPr lang="en-US" sz="1200" b="1" dirty="0" smtClean="0"/>
-          </a:p>
-          <a:p>
-            <a:pPr algn="l"/>
-            <a:r>
-              <a:rPr lang="en-US" sz="1000" b="1" dirty="0" smtClean="0"/>
-              <a:t>+</a:t>
-            </a:r>
-            <a:r>
-              <a:rPr lang="en-US" sz="1000" b="1" dirty="0" err="1" smtClean="0"/>
-              <a:t>BoardSetup</a:t>
-            </a:r>
-            <a:r>
-              <a:rPr lang="en-US" sz="1000" b="1" dirty="0" smtClean="0"/>
-              <a:t>()</a:t>
-            </a:r>
-          </a:p>
-          <a:p>
-            <a:pPr algn="l"/>
-            <a:r>
-              <a:rPr lang="en-US" sz="1000" b="1" dirty="0" smtClean="0"/>
-              <a:t>+</a:t>
-            </a:r>
-            <a:r>
-              <a:rPr lang="en-US" sz="1000" b="1" dirty="0" err="1" smtClean="0"/>
-              <a:t>generateNewBoard</a:t>
-            </a:r>
-            <a:r>
-              <a:rPr lang="en-US" sz="1000" b="1" dirty="0" smtClean="0"/>
-              <a:t>()</a:t>
-            </a:r>
-          </a:p>
-          <a:p>
-            <a:pPr algn="l"/>
-            <a:r>
-              <a:rPr lang="en-US" sz="1000" b="1" dirty="0" smtClean="0"/>
-              <a:t>-</a:t>
-            </a:r>
-            <a:r>
-              <a:rPr lang="en-US" sz="1000" b="1" dirty="0" err="1" smtClean="0"/>
-              <a:t>generateValidRandomBoard</a:t>
-            </a:r>
-            <a:r>
-              <a:rPr lang="en-US" sz="1000" b="1" dirty="0" smtClean="0"/>
-              <a:t>()</a:t>
-            </a:r>
-          </a:p>
-          <a:p>
-            <a:pPr algn="l"/>
-            <a:r>
-              <a:rPr lang="en-US" sz="1000" b="1" dirty="0" smtClean="0"/>
-              <a:t>-</a:t>
-            </a:r>
-            <a:r>
-              <a:rPr lang="en-US" sz="1000" b="1" dirty="0" err="1" smtClean="0"/>
-              <a:t>validRandomBoardHelper</a:t>
-            </a:r>
-            <a:r>
-              <a:rPr lang="en-US" sz="1000" b="1" dirty="0" smtClean="0"/>
-              <a:t>()</a:t>
-            </a:r>
-          </a:p>
-          <a:p>
-            <a:pPr algn="l"/>
-            <a:r>
-              <a:rPr lang="en-US" sz="1000" b="1" dirty="0" smtClean="0"/>
-              <a:t>-</a:t>
-            </a:r>
-            <a:r>
-              <a:rPr lang="en-US" sz="1000" b="1" dirty="0" err="1" smtClean="0"/>
-              <a:t>getRandomLetter</a:t>
-            </a:r>
-            <a:r>
-              <a:rPr lang="en-US" sz="1000" b="1" dirty="0" smtClean="0"/>
-              <a:t>()</a:t>
-            </a:r>
-          </a:p>
-          <a:p>
-            <a:pPr algn="l"/>
-            <a:endParaRPr lang="en-US" sz="1200" b="1" dirty="0" smtClean="0"/>
-          </a:p>
-          <a:p>
-            <a:endParaRPr lang="en-US" sz="1200" dirty="0" smtClean="0"/>
-          </a:p>
-        </p:txBody>
-      </p:sp>
-      <p:cxnSp>
-        <p:nvCxnSpPr>
-          <p:cNvPr id="16" name="Straight Arrow Connector 15"/>
-          <p:cNvCxnSpPr>
-            <a:stCxn id="7" idx="3"/>
-          </p:cNvCxnSpPr>
-          <p:nvPr/>
-        </p:nvCxnSpPr>
-        <p:spPr>
-          <a:xfrm>
-            <a:off x="1016424" y="344452"/>
-            <a:ext cx="507576" cy="0"/>
-          </a:xfrm>
-          <a:prstGeom prst="straightConnector1">
-            <a:avLst/>
-          </a:prstGeom>
-          <a:ln>
-            <a:tailEnd type="arrow"/>
-          </a:ln>
-        </p:spPr>
-        <p:style>
-          <a:lnRef idx="1">
-            <a:schemeClr val="accent1"/>
-          </a:lnRef>
-          <a:fillRef idx="0">
-            <a:schemeClr val="accent1"/>
-          </a:fillRef>
-          <a:effectRef idx="0">
-            <a:schemeClr val="accent1"/>
-          </a:effectRef>
-          <a:fontRef idx="minor">
-            <a:schemeClr val="tx1"/>
-          </a:fontRef>
-        </p:style>
-      </p:cxnSp>
-      <p:cxnSp>
-        <p:nvCxnSpPr>
-          <p:cNvPr id="18" name="Straight Arrow Connector 17"/>
-          <p:cNvCxnSpPr>
-            <a:stCxn id="10" idx="3"/>
-          </p:cNvCxnSpPr>
-          <p:nvPr/>
-        </p:nvCxnSpPr>
-        <p:spPr>
-          <a:xfrm>
-            <a:off x="2743200" y="952500"/>
-            <a:ext cx="1063833" cy="0"/>
-          </a:xfrm>
-          <a:prstGeom prst="straightConnector1">
-            <a:avLst/>
-          </a:prstGeom>
-          <a:ln>
-            <a:tailEnd type="arrow"/>
-          </a:ln>
-        </p:spPr>
-        <p:style>
-          <a:lnRef idx="1">
-            <a:schemeClr val="accent1"/>
-          </a:lnRef>
-          <a:fillRef idx="0">
-            <a:schemeClr val="accent1"/>
-          </a:fillRef>
-          <a:effectRef idx="0">
-            <a:schemeClr val="accent1"/>
-          </a:effectRef>
-          <a:fontRef idx="minor">
-            <a:schemeClr val="tx1"/>
-          </a:fontRef>
-        </p:style>
-      </p:cxnSp>
-      <p:cxnSp>
-        <p:nvCxnSpPr>
-          <p:cNvPr id="20" name="Straight Arrow Connector 19"/>
-          <p:cNvCxnSpPr/>
-          <p:nvPr/>
-        </p:nvCxnSpPr>
-        <p:spPr>
-          <a:xfrm>
-            <a:off x="7200899" y="1326426"/>
-            <a:ext cx="0" cy="752475"/>
-          </a:xfrm>
-          <a:prstGeom prst="straightConnector1">
-            <a:avLst/>
-          </a:prstGeom>
-          <a:ln>
-            <a:tailEnd type="arrow"/>
-          </a:ln>
-        </p:spPr>
-        <p:style>
-          <a:lnRef idx="1">
-            <a:schemeClr val="accent1"/>
-          </a:lnRef>
-          <a:fillRef idx="0">
-            <a:schemeClr val="accent1"/>
-          </a:fillRef>
-          <a:effectRef idx="0">
-            <a:schemeClr val="accent1"/>
-          </a:effectRef>
-          <a:fontRef idx="minor">
-            <a:schemeClr val="tx1"/>
-          </a:fontRef>
-        </p:style>
-      </p:cxnSp>
-      <p:cxnSp>
-        <p:nvCxnSpPr>
-          <p:cNvPr id="22" name="Straight Arrow Connector 21"/>
-          <p:cNvCxnSpPr>
-            <a:stCxn id="11" idx="3"/>
-            <a:endCxn id="14" idx="1"/>
-          </p:cNvCxnSpPr>
-          <p:nvPr/>
-        </p:nvCxnSpPr>
-        <p:spPr>
-          <a:xfrm flipV="1">
-            <a:off x="5410200" y="678726"/>
-            <a:ext cx="838200" cy="318346"/>
-          </a:xfrm>
-          <a:prstGeom prst="straightConnector1">
-            <a:avLst/>
-          </a:prstGeom>
-          <a:ln>
-            <a:tailEnd type="arrow"/>
-          </a:ln>
-        </p:spPr>
-        <p:style>
-          <a:lnRef idx="1">
-            <a:schemeClr val="accent1"/>
-          </a:lnRef>
-          <a:fillRef idx="0">
-            <a:schemeClr val="accent1"/>
-          </a:fillRef>
-          <a:effectRef idx="0">
-            <a:schemeClr val="accent1"/>
-          </a:effectRef>
-          <a:fontRef idx="minor">
-            <a:schemeClr val="tx1"/>
-          </a:fontRef>
-        </p:style>
-      </p:cxnSp>
-      <p:cxnSp>
-        <p:nvCxnSpPr>
-          <p:cNvPr id="32" name="Straight Arrow Connector 31"/>
-          <p:cNvCxnSpPr/>
-          <p:nvPr/>
-        </p:nvCxnSpPr>
-        <p:spPr>
-          <a:xfrm>
-            <a:off x="7210423" y="3352800"/>
-            <a:ext cx="0" cy="752475"/>
-          </a:xfrm>
-          <a:prstGeom prst="straightConnector1">
-            <a:avLst/>
-          </a:prstGeom>
-          <a:ln>
-            <a:tailEnd type="arrow"/>
-          </a:ln>
-        </p:spPr>
-        <p:style>
-          <a:lnRef idx="1">
-            <a:schemeClr val="accent1"/>
-          </a:lnRef>
-          <a:fillRef idx="0">
-            <a:schemeClr val="accent1"/>
-          </a:fillRef>
-          <a:effectRef idx="0">
-            <a:schemeClr val="accent1"/>
-          </a:effectRef>
-          <a:fontRef idx="minor">
-            <a:schemeClr val="tx1"/>
-          </a:fontRef>
-        </p:style>
-      </p:cxnSp>
-      <p:cxnSp>
-        <p:nvCxnSpPr>
-          <p:cNvPr id="33" name="Straight Arrow Connector 32"/>
-          <p:cNvCxnSpPr/>
-          <p:nvPr/>
-        </p:nvCxnSpPr>
-        <p:spPr>
-          <a:xfrm>
-            <a:off x="2133600" y="1905000"/>
-            <a:ext cx="0" cy="533400"/>
-          </a:xfrm>
-          <a:prstGeom prst="straightConnector1">
-            <a:avLst/>
-          </a:prstGeom>
-          <a:ln>
-            <a:tailEnd type="arrow"/>
-          </a:ln>
-        </p:spPr>
-        <p:style>
-          <a:lnRef idx="1">
-            <a:schemeClr val="accent1"/>
-          </a:lnRef>
-          <a:fillRef idx="0">
-            <a:schemeClr val="accent1"/>
-          </a:fillRef>
-          <a:effectRef idx="0">
-            <a:schemeClr val="accent1"/>
-          </a:effectRef>
-          <a:fontRef idx="minor">
-            <a:schemeClr val="tx1"/>
-          </a:fontRef>
-        </p:style>
-      </p:cxnSp>
-      <p:sp>
-        <p:nvSpPr>
-          <p:cNvPr id="35" name="Subtitle 2"/>
-          <p:cNvSpPr txBox="1">
-            <a:spLocks/>
-          </p:cNvSpPr>
-          <p:nvPr/>
-        </p:nvSpPr>
-        <p:spPr>
-          <a:xfrm>
-            <a:off x="1524000" y="2438400"/>
-            <a:ext cx="1371600" cy="1752600"/>
-          </a:xfrm>
-          <a:prstGeom prst="rect">
-            <a:avLst/>
-          </a:prstGeom>
-          <a:ln>
-            <a:solidFill>
-              <a:schemeClr val="accent1"/>
-            </a:solidFill>
-          </a:ln>
-        </p:spPr>
-        <p:txBody>
-          <a:bodyPr vert="horz" lIns="91440" tIns="45720" rIns="91440" bIns="45720" rtlCol="0">
-            <a:normAutofit/>
-          </a:bodyPr>
-          <a:lstStyle>
-            <a:lvl1pPr marL="0" indent="0" algn="ctr" defTabSz="914400" rtl="0" eaLnBrk="1" latinLnBrk="0" hangingPunct="1">
-              <a:spcBef>
-                <a:spcPct val="20000"/>
-              </a:spcBef>
-              <a:buFont typeface="Arial" pitchFamily="34" charset="0"/>
-              <a:buNone/>
-              <a:defRPr sz="3200" kern="1200">
-                <a:solidFill>
-                  <a:schemeClr val="tx1">
-                    <a:tint val="75000"/>
-                  </a:schemeClr>
-                </a:solidFill>
-                <a:latin typeface="+mn-lt"/>
-                <a:ea typeface="+mn-ea"/>
-                <a:cs typeface="+mn-cs"/>
-              </a:defRPr>
-            </a:lvl1pPr>
-            <a:lvl2pPr marL="457200" indent="0" algn="ctr" defTabSz="914400" rtl="0" eaLnBrk="1" latinLnBrk="0" hangingPunct="1">
-              <a:spcBef>
-                <a:spcPct val="20000"/>
-              </a:spcBef>
-              <a:buFont typeface="Arial" pitchFamily="34" charset="0"/>
-              <a:buNone/>
-              <a:defRPr sz="2800" kern="1200">
-                <a:solidFill>
-                  <a:schemeClr val="tx1">
-                    <a:tint val="75000"/>
-                  </a:schemeClr>
-                </a:solidFill>
-                <a:latin typeface="+mn-lt"/>
-                <a:ea typeface="+mn-ea"/>
-                <a:cs typeface="+mn-cs"/>
-              </a:defRPr>
-            </a:lvl2pPr>
-            <a:lvl3pPr marL="914400" indent="0" algn="ctr" defTabSz="914400" rtl="0" eaLnBrk="1" latinLnBrk="0" hangingPunct="1">
-              <a:spcBef>
-                <a:spcPct val="20000"/>
-              </a:spcBef>
-              <a:buFont typeface="Arial" pitchFamily="34" charset="0"/>
-              <a:buNone/>
-              <a:defRPr sz="2400" kern="1200">
-                <a:solidFill>
-                  <a:schemeClr val="tx1">
-                    <a:tint val="75000"/>
-                  </a:schemeClr>
-                </a:solidFill>
-                <a:latin typeface="+mn-lt"/>
-                <a:ea typeface="+mn-ea"/>
-                <a:cs typeface="+mn-cs"/>
-              </a:defRPr>
-            </a:lvl3pPr>
-            <a:lvl4pPr marL="1371600" indent="0" algn="ctr" defTabSz="914400" rtl="0" eaLnBrk="1" latinLnBrk="0" hangingPunct="1">
-              <a:spcBef>
-                <a:spcPct val="20000"/>
-              </a:spcBef>
-              <a:buFont typeface="Arial" pitchFamily="34" charset="0"/>
-              <a:buNone/>
-              <a:defRPr sz="2000" kern="1200">
-                <a:solidFill>
-                  <a:schemeClr val="tx1">
-                    <a:tint val="75000"/>
-                  </a:schemeClr>
-                </a:solidFill>
-                <a:latin typeface="+mn-lt"/>
-                <a:ea typeface="+mn-ea"/>
-                <a:cs typeface="+mn-cs"/>
-              </a:defRPr>
-            </a:lvl4pPr>
-            <a:lvl5pPr marL="1828800" indent="0" algn="ctr" defTabSz="914400" rtl="0" eaLnBrk="1" latinLnBrk="0" hangingPunct="1">
-              <a:spcBef>
-                <a:spcPct val="20000"/>
-              </a:spcBef>
-              <a:buFont typeface="Arial" pitchFamily="34" charset="0"/>
-              <a:buNone/>
-              <a:defRPr sz="2000" kern="1200">
-                <a:solidFill>
-                  <a:schemeClr val="tx1">
-                    <a:tint val="75000"/>
-                  </a:schemeClr>
-                </a:solidFill>
-                <a:latin typeface="+mn-lt"/>
-                <a:ea typeface="+mn-ea"/>
-                <a:cs typeface="+mn-cs"/>
-              </a:defRPr>
-            </a:lvl5pPr>
-            <a:lvl6pPr marL="2286000" indent="0" algn="ctr" defTabSz="914400" rtl="0" eaLnBrk="1" latinLnBrk="0" hangingPunct="1">
-              <a:spcBef>
-                <a:spcPct val="20000"/>
-              </a:spcBef>
-              <a:buFont typeface="Arial" pitchFamily="34" charset="0"/>
-              <a:buNone/>
-              <a:defRPr sz="2000" kern="1200">
-                <a:solidFill>
-                  <a:schemeClr val="tx1">
-                    <a:tint val="75000"/>
-                  </a:schemeClr>
-                </a:solidFill>
-                <a:latin typeface="+mn-lt"/>
-                <a:ea typeface="+mn-ea"/>
-                <a:cs typeface="+mn-cs"/>
-              </a:defRPr>
-            </a:lvl6pPr>
-            <a:lvl7pPr marL="2743200" indent="0" algn="ctr" defTabSz="914400" rtl="0" eaLnBrk="1" latinLnBrk="0" hangingPunct="1">
-              <a:spcBef>
-                <a:spcPct val="20000"/>
-              </a:spcBef>
-              <a:buFont typeface="Arial" pitchFamily="34" charset="0"/>
-              <a:buNone/>
-              <a:defRPr sz="2000" kern="1200">
-                <a:solidFill>
-                  <a:schemeClr val="tx1">
-                    <a:tint val="75000"/>
-                  </a:schemeClr>
-                </a:solidFill>
-                <a:latin typeface="+mn-lt"/>
-                <a:ea typeface="+mn-ea"/>
-                <a:cs typeface="+mn-cs"/>
-              </a:defRPr>
-            </a:lvl7pPr>
-            <a:lvl8pPr marL="3200400" indent="0" algn="ctr" defTabSz="914400" rtl="0" eaLnBrk="1" latinLnBrk="0" hangingPunct="1">
-              <a:spcBef>
-                <a:spcPct val="20000"/>
-              </a:spcBef>
-              <a:buFont typeface="Arial" pitchFamily="34" charset="0"/>
-              <a:buNone/>
-              <a:defRPr sz="2000" kern="1200">
-                <a:solidFill>
-                  <a:schemeClr val="tx1">
-                    <a:tint val="75000"/>
-                  </a:schemeClr>
-                </a:solidFill>
-                <a:latin typeface="+mn-lt"/>
-                <a:ea typeface="+mn-ea"/>
-                <a:cs typeface="+mn-cs"/>
-              </a:defRPr>
-            </a:lvl8pPr>
-            <a:lvl9pPr marL="3657600" indent="0" algn="ctr" defTabSz="914400" rtl="0" eaLnBrk="1" latinLnBrk="0" hangingPunct="1">
-              <a:spcBef>
-                <a:spcPct val="20000"/>
-              </a:spcBef>
-              <a:buFont typeface="Arial" pitchFamily="34" charset="0"/>
-              <a:buNone/>
-              <a:defRPr sz="2000" kern="1200">
-                <a:solidFill>
-                  <a:schemeClr val="tx1">
-                    <a:tint val="75000"/>
-                  </a:schemeClr>
-                </a:solidFill>
-                <a:latin typeface="+mn-lt"/>
-                <a:ea typeface="+mn-ea"/>
-                <a:cs typeface="+mn-cs"/>
-              </a:defRPr>
-            </a:lvl9pPr>
-          </a:lstStyle>
-          <a:p>
-            <a:r>
-              <a:rPr lang="en-US" sz="1200" b="1" dirty="0" err="1" smtClean="0"/>
-              <a:t>BoggleTimer</a:t>
-            </a:r>
-            <a:endParaRPr lang="en-US" sz="1200" b="1" dirty="0" smtClean="0"/>
-          </a:p>
-          <a:p>
-            <a:pPr algn="l"/>
-            <a:r>
-              <a:rPr lang="en-US" sz="1000" b="1" dirty="0" smtClean="0"/>
-              <a:t>+</a:t>
-            </a:r>
-            <a:r>
-              <a:rPr lang="en-US" sz="1000" b="1" dirty="0" err="1" smtClean="0"/>
-              <a:t>BoggleTimer</a:t>
-            </a:r>
-            <a:r>
-              <a:rPr lang="en-US" sz="1000" b="1" dirty="0" smtClean="0"/>
-              <a:t>()</a:t>
-            </a:r>
-          </a:p>
-          <a:p>
-            <a:pPr algn="l"/>
-            <a:r>
-              <a:rPr lang="en-US" sz="1000" b="1" dirty="0" smtClean="0"/>
-              <a:t>+</a:t>
-            </a:r>
-            <a:r>
-              <a:rPr lang="en-US" sz="1000" b="1" dirty="0" err="1" smtClean="0"/>
-              <a:t>startTime</a:t>
-            </a:r>
-            <a:r>
-              <a:rPr lang="en-US" sz="1000" b="1" dirty="0" smtClean="0"/>
-              <a:t>()</a:t>
-            </a:r>
-          </a:p>
-          <a:p>
-            <a:pPr algn="l"/>
-            <a:r>
-              <a:rPr lang="en-US" sz="1000" b="1" dirty="0" smtClean="0"/>
-              <a:t>+</a:t>
-            </a:r>
-            <a:r>
-              <a:rPr lang="en-US" sz="1000" b="1" dirty="0" err="1" smtClean="0"/>
-              <a:t>restartTimer</a:t>
-            </a:r>
-            <a:r>
-              <a:rPr lang="en-US" sz="1000" b="1" dirty="0" smtClean="0"/>
-              <a:t>()</a:t>
-            </a:r>
-          </a:p>
-          <a:p>
-            <a:pPr algn="l"/>
-            <a:r>
-              <a:rPr lang="en-US" sz="1000" b="1" dirty="0" smtClean="0"/>
-              <a:t>+</a:t>
-            </a:r>
-            <a:r>
-              <a:rPr lang="en-US" sz="1000" b="1" dirty="0" err="1" smtClean="0"/>
-              <a:t>pauseTimer</a:t>
-            </a:r>
-            <a:r>
-              <a:rPr lang="en-US" sz="1000" b="1" dirty="0" smtClean="0"/>
-              <a:t>()</a:t>
-            </a:r>
-          </a:p>
-          <a:p>
-            <a:pPr algn="l"/>
-            <a:r>
-              <a:rPr lang="en-US" sz="1000" b="1" dirty="0" smtClean="0"/>
-              <a:t>+</a:t>
-            </a:r>
-            <a:r>
-              <a:rPr lang="en-US" sz="1000" b="1" dirty="0" err="1" smtClean="0"/>
-              <a:t>setGameOverEvent</a:t>
-            </a:r>
-            <a:r>
-              <a:rPr lang="en-US" sz="1000" b="1" dirty="0" smtClean="0"/>
-              <a:t>()</a:t>
-            </a:r>
-          </a:p>
-          <a:p>
-            <a:pPr algn="l"/>
-            <a:r>
-              <a:rPr lang="en-US" sz="1000" b="1" dirty="0" smtClean="0"/>
-              <a:t>-</a:t>
-            </a:r>
-            <a:r>
-              <a:rPr lang="en-US" sz="1000" b="1" dirty="0" err="1" smtClean="0"/>
-              <a:t>initializeGameTimer</a:t>
-            </a:r>
-            <a:r>
-              <a:rPr lang="en-US" sz="1000" b="1" dirty="0" smtClean="0"/>
-              <a:t>()</a:t>
-            </a:r>
-          </a:p>
-          <a:p>
-            <a:pPr algn="l"/>
-            <a:r>
-              <a:rPr lang="en-US" sz="1000" b="1" dirty="0" smtClean="0"/>
-              <a:t>-</a:t>
-            </a:r>
-            <a:r>
-              <a:rPr lang="en-US" sz="1000" b="1" dirty="0" err="1" smtClean="0"/>
-              <a:t>decrementTime</a:t>
-            </a:r>
-            <a:r>
-              <a:rPr lang="en-US" sz="1000" b="1" dirty="0" smtClean="0"/>
-              <a:t>()</a:t>
-            </a:r>
-          </a:p>
-          <a:p>
-            <a:pPr algn="l"/>
-            <a:r>
-              <a:rPr lang="en-US" sz="1000" b="1" dirty="0" smtClean="0"/>
-              <a:t>-</a:t>
-            </a:r>
-            <a:r>
-              <a:rPr lang="en-US" sz="1000" b="1" dirty="0" err="1" smtClean="0"/>
-              <a:t>updateLabel</a:t>
-            </a:r>
-            <a:r>
-              <a:rPr lang="en-US" sz="1000" b="1" dirty="0" smtClean="0"/>
-              <a:t>()</a:t>
-            </a:r>
-          </a:p>
-          <a:p>
-            <a:pPr algn="l"/>
-            <a:endParaRPr lang="en-US" sz="1000" b="1" dirty="0" smtClean="0"/>
-          </a:p>
-          <a:p>
-            <a:endParaRPr lang="en-US" sz="1200" dirty="0" smtClean="0"/>
-          </a:p>
-        </p:txBody>
-      </p:sp>
-      <p:sp>
-        <p:nvSpPr>
-          <p:cNvPr id="37" name="Subtitle 2"/>
-          <p:cNvSpPr txBox="1">
-            <a:spLocks/>
-          </p:cNvSpPr>
-          <p:nvPr/>
-        </p:nvSpPr>
-        <p:spPr>
-          <a:xfrm>
-            <a:off x="3657600" y="2590800"/>
-            <a:ext cx="1295400" cy="1600200"/>
-          </a:xfrm>
-          <a:prstGeom prst="rect">
-            <a:avLst/>
-          </a:prstGeom>
-          <a:ln>
-            <a:solidFill>
-              <a:schemeClr val="accent1"/>
-            </a:solidFill>
-          </a:ln>
-        </p:spPr>
-        <p:txBody>
-          <a:bodyPr vert="horz" lIns="91440" tIns="45720" rIns="91440" bIns="45720" rtlCol="0">
-            <a:normAutofit/>
-          </a:bodyPr>
-          <a:lstStyle>
-            <a:lvl1pPr marL="0" indent="0" algn="ctr" defTabSz="914400" rtl="0" eaLnBrk="1" latinLnBrk="0" hangingPunct="1">
-              <a:spcBef>
-                <a:spcPct val="20000"/>
-              </a:spcBef>
-              <a:buFont typeface="Arial" pitchFamily="34" charset="0"/>
-              <a:buNone/>
-              <a:defRPr sz="3200" kern="1200">
-                <a:solidFill>
-                  <a:schemeClr val="tx1">
-                    <a:tint val="75000"/>
-                  </a:schemeClr>
-                </a:solidFill>
-                <a:latin typeface="+mn-lt"/>
-                <a:ea typeface="+mn-ea"/>
-                <a:cs typeface="+mn-cs"/>
-              </a:defRPr>
-            </a:lvl1pPr>
-            <a:lvl2pPr marL="457200" indent="0" algn="ctr" defTabSz="914400" rtl="0" eaLnBrk="1" latinLnBrk="0" hangingPunct="1">
-              <a:spcBef>
-                <a:spcPct val="20000"/>
-              </a:spcBef>
-              <a:buFont typeface="Arial" pitchFamily="34" charset="0"/>
-              <a:buNone/>
-              <a:defRPr sz="2800" kern="1200">
-                <a:solidFill>
-                  <a:schemeClr val="tx1">
-                    <a:tint val="75000"/>
-                  </a:schemeClr>
-                </a:solidFill>
-                <a:latin typeface="+mn-lt"/>
-                <a:ea typeface="+mn-ea"/>
-                <a:cs typeface="+mn-cs"/>
-              </a:defRPr>
-            </a:lvl2pPr>
-            <a:lvl3pPr marL="914400" indent="0" algn="ctr" defTabSz="914400" rtl="0" eaLnBrk="1" latinLnBrk="0" hangingPunct="1">
-              <a:spcBef>
-                <a:spcPct val="20000"/>
-              </a:spcBef>
-              <a:buFont typeface="Arial" pitchFamily="34" charset="0"/>
-              <a:buNone/>
-              <a:defRPr sz="2400" kern="1200">
-                <a:solidFill>
-                  <a:schemeClr val="tx1">
-                    <a:tint val="75000"/>
-                  </a:schemeClr>
-                </a:solidFill>
-                <a:latin typeface="+mn-lt"/>
-                <a:ea typeface="+mn-ea"/>
-                <a:cs typeface="+mn-cs"/>
-              </a:defRPr>
-            </a:lvl3pPr>
-            <a:lvl4pPr marL="1371600" indent="0" algn="ctr" defTabSz="914400" rtl="0" eaLnBrk="1" latinLnBrk="0" hangingPunct="1">
-              <a:spcBef>
-                <a:spcPct val="20000"/>
-              </a:spcBef>
-              <a:buFont typeface="Arial" pitchFamily="34" charset="0"/>
-              <a:buNone/>
-              <a:defRPr sz="2000" kern="1200">
-                <a:solidFill>
-                  <a:schemeClr val="tx1">
-                    <a:tint val="75000"/>
-                  </a:schemeClr>
-                </a:solidFill>
-                <a:latin typeface="+mn-lt"/>
-                <a:ea typeface="+mn-ea"/>
-                <a:cs typeface="+mn-cs"/>
-              </a:defRPr>
-            </a:lvl4pPr>
-            <a:lvl5pPr marL="1828800" indent="0" algn="ctr" defTabSz="914400" rtl="0" eaLnBrk="1" latinLnBrk="0" hangingPunct="1">
-              <a:spcBef>
-                <a:spcPct val="20000"/>
-              </a:spcBef>
-              <a:buFont typeface="Arial" pitchFamily="34" charset="0"/>
-              <a:buNone/>
-              <a:defRPr sz="2000" kern="1200">
-                <a:solidFill>
-                  <a:schemeClr val="tx1">
-                    <a:tint val="75000"/>
-                  </a:schemeClr>
-                </a:solidFill>
-                <a:latin typeface="+mn-lt"/>
-                <a:ea typeface="+mn-ea"/>
-                <a:cs typeface="+mn-cs"/>
-              </a:defRPr>
-            </a:lvl5pPr>
-            <a:lvl6pPr marL="2286000" indent="0" algn="ctr" defTabSz="914400" rtl="0" eaLnBrk="1" latinLnBrk="0" hangingPunct="1">
-              <a:spcBef>
-                <a:spcPct val="20000"/>
-              </a:spcBef>
-              <a:buFont typeface="Arial" pitchFamily="34" charset="0"/>
-              <a:buNone/>
-              <a:defRPr sz="2000" kern="1200">
-                <a:solidFill>
-                  <a:schemeClr val="tx1">
-                    <a:tint val="75000"/>
-                  </a:schemeClr>
-                </a:solidFill>
-                <a:latin typeface="+mn-lt"/>
-                <a:ea typeface="+mn-ea"/>
-                <a:cs typeface="+mn-cs"/>
-              </a:defRPr>
-            </a:lvl6pPr>
-            <a:lvl7pPr marL="2743200" indent="0" algn="ctr" defTabSz="914400" rtl="0" eaLnBrk="1" latinLnBrk="0" hangingPunct="1">
-              <a:spcBef>
-                <a:spcPct val="20000"/>
-              </a:spcBef>
-              <a:buFont typeface="Arial" pitchFamily="34" charset="0"/>
-              <a:buNone/>
-              <a:defRPr sz="2000" kern="1200">
-                <a:solidFill>
-                  <a:schemeClr val="tx1">
-                    <a:tint val="75000"/>
-                  </a:schemeClr>
-                </a:solidFill>
-                <a:latin typeface="+mn-lt"/>
-                <a:ea typeface="+mn-ea"/>
-                <a:cs typeface="+mn-cs"/>
-              </a:defRPr>
-            </a:lvl7pPr>
-            <a:lvl8pPr marL="3200400" indent="0" algn="ctr" defTabSz="914400" rtl="0" eaLnBrk="1" latinLnBrk="0" hangingPunct="1">
-              <a:spcBef>
-                <a:spcPct val="20000"/>
-              </a:spcBef>
-              <a:buFont typeface="Arial" pitchFamily="34" charset="0"/>
-              <a:buNone/>
-              <a:defRPr sz="2000" kern="1200">
-                <a:solidFill>
-                  <a:schemeClr val="tx1">
-                    <a:tint val="75000"/>
-                  </a:schemeClr>
-                </a:solidFill>
-                <a:latin typeface="+mn-lt"/>
-                <a:ea typeface="+mn-ea"/>
-                <a:cs typeface="+mn-cs"/>
-              </a:defRPr>
-            </a:lvl8pPr>
-            <a:lvl9pPr marL="3657600" indent="0" algn="ctr" defTabSz="914400" rtl="0" eaLnBrk="1" latinLnBrk="0" hangingPunct="1">
-              <a:spcBef>
-                <a:spcPct val="20000"/>
-              </a:spcBef>
-              <a:buFont typeface="Arial" pitchFamily="34" charset="0"/>
-              <a:buNone/>
-              <a:defRPr sz="2000" kern="1200">
-                <a:solidFill>
-                  <a:schemeClr val="tx1">
-                    <a:tint val="75000"/>
-                  </a:schemeClr>
-                </a:solidFill>
-                <a:latin typeface="+mn-lt"/>
-                <a:ea typeface="+mn-ea"/>
-                <a:cs typeface="+mn-cs"/>
-              </a:defRPr>
-            </a:lvl9pPr>
-          </a:lstStyle>
-          <a:p>
-            <a:r>
-              <a:rPr lang="en-US" sz="1200" b="1" dirty="0" err="1" smtClean="0"/>
-              <a:t>BogglePiece</a:t>
-            </a:r>
-            <a:endParaRPr lang="en-US" sz="1200" b="1" dirty="0" smtClean="0"/>
-          </a:p>
-          <a:p>
-            <a:pPr algn="l"/>
-            <a:r>
-              <a:rPr lang="en-US" sz="1000" b="1" dirty="0" smtClean="0"/>
-              <a:t>+</a:t>
-            </a:r>
-            <a:r>
-              <a:rPr lang="en-US" sz="1000" b="1" dirty="0" err="1" smtClean="0"/>
-              <a:t>BogglePiece</a:t>
-            </a:r>
-            <a:r>
-              <a:rPr lang="en-US" sz="1000" b="1" dirty="0" smtClean="0"/>
-              <a:t>()</a:t>
-            </a:r>
-          </a:p>
-          <a:p>
-            <a:pPr algn="l"/>
-            <a:r>
-              <a:rPr lang="en-US" sz="1000" b="1" dirty="0" smtClean="0"/>
-              <a:t>+draw()</a:t>
-            </a:r>
-          </a:p>
-          <a:p>
-            <a:pPr algn="l"/>
-            <a:r>
-              <a:rPr lang="en-US" sz="1000" b="1" dirty="0" smtClean="0"/>
-              <a:t>+</a:t>
-            </a:r>
-            <a:r>
-              <a:rPr lang="en-US" sz="1000" b="1" dirty="0" err="1" smtClean="0"/>
-              <a:t>isInBounds</a:t>
-            </a:r>
-            <a:r>
-              <a:rPr lang="en-US" sz="1000" b="1" dirty="0" smtClean="0"/>
-              <a:t>()</a:t>
-            </a:r>
-          </a:p>
-          <a:p>
-            <a:pPr algn="l"/>
-            <a:r>
-              <a:rPr lang="en-US" sz="1000" b="1" dirty="0" smtClean="0"/>
-              <a:t>+</a:t>
-            </a:r>
-            <a:r>
-              <a:rPr lang="en-US" sz="1000" b="1" dirty="0" err="1" smtClean="0"/>
-              <a:t>getLetter</a:t>
-            </a:r>
-            <a:r>
-              <a:rPr lang="en-US" sz="1000" b="1" dirty="0" smtClean="0"/>
-              <a:t>()</a:t>
-            </a:r>
-          </a:p>
-          <a:p>
-            <a:pPr algn="l"/>
-            <a:r>
-              <a:rPr lang="en-US" sz="1000" b="1" dirty="0" smtClean="0"/>
-              <a:t>+</a:t>
-            </a:r>
-            <a:r>
-              <a:rPr lang="en-US" sz="1000" b="1" dirty="0" err="1" smtClean="0"/>
-              <a:t>getIsHighlighted</a:t>
-            </a:r>
-            <a:r>
-              <a:rPr lang="en-US" sz="1000" b="1" dirty="0" smtClean="0"/>
-              <a:t>()</a:t>
-            </a:r>
-          </a:p>
-          <a:p>
-            <a:pPr algn="l"/>
-            <a:r>
-              <a:rPr lang="en-US" sz="1000" b="1" dirty="0" smtClean="0"/>
-              <a:t>+</a:t>
-            </a:r>
-            <a:r>
-              <a:rPr lang="en-US" sz="1000" b="1" dirty="0" err="1" smtClean="0"/>
-              <a:t>setIsHighighted</a:t>
-            </a:r>
-            <a:r>
-              <a:rPr lang="en-US" sz="1000" b="1" dirty="0" smtClean="0"/>
-              <a:t>()</a:t>
-            </a:r>
-          </a:p>
-          <a:p>
-            <a:pPr algn="l"/>
-            <a:r>
-              <a:rPr lang="en-US" sz="1000" b="1" dirty="0" smtClean="0"/>
-              <a:t>+</a:t>
-            </a:r>
-            <a:r>
-              <a:rPr lang="en-US" sz="1000" b="1" dirty="0" err="1" smtClean="0"/>
-              <a:t>isNeighbor</a:t>
-            </a:r>
-            <a:r>
-              <a:rPr lang="en-US" sz="1000" b="1" dirty="0" smtClean="0"/>
-              <a:t>()</a:t>
-            </a:r>
-          </a:p>
-          <a:p>
-            <a:pPr algn="l"/>
-            <a:endParaRPr lang="en-US" sz="1200" b="1" dirty="0" smtClean="0"/>
-          </a:p>
-          <a:p>
-            <a:pPr algn="l"/>
-            <a:endParaRPr lang="en-US" sz="1200" b="1" dirty="0" smtClean="0"/>
-          </a:p>
-          <a:p>
-            <a:endParaRPr lang="en-US" sz="1200" dirty="0" smtClean="0"/>
-          </a:p>
-        </p:txBody>
-      </p:sp>
-    </p:spTree>
-    <p:extLst>
-      <p:ext uri="{BB962C8B-B14F-4D97-AF65-F5344CB8AC3E}">
-        <p14:creationId xmlns:p14="http://schemas.microsoft.com/office/powerpoint/2010/main" val="3294002950"/>
       </p:ext>
     </p:extLst>
   </p:cSld>

</xml_diff>